<commit_message>
changed the powerpoints slightly
</commit_message>
<xml_diff>
--- a/Notes/Structure Of Classes/Integration of Classes.pptx
+++ b/Notes/Structure Of Classes/Integration of Classes.pptx
@@ -4686,41 +4686,6 @@
       </p:sp>
       <p:sp>
         <p:nvSpPr>
-          <p:cNvPr id="68" name="TextBox 67">
-            <a:extLst>
-              <a:ext uri="{FF2B5EF4-FFF2-40B4-BE49-F238E27FC236}">
-                <a16:creationId xmlns:a16="http://schemas.microsoft.com/office/drawing/2014/main" id="{B7AD648F-4148-3E45-9757-B4C0C13D27D5}"/>
-              </a:ext>
-            </a:extLst>
-          </p:cNvPr>
-          <p:cNvSpPr txBox="1"/>
-          <p:nvPr/>
-        </p:nvSpPr>
-        <p:spPr>
-          <a:xfrm rot="20040692">
-            <a:off x="345480" y="3584037"/>
-            <a:ext cx="1418896" cy="523220"/>
-          </a:xfrm>
-          <a:prstGeom prst="rect">
-            <a:avLst/>
-          </a:prstGeom>
-          <a:noFill/>
-        </p:spPr>
-        <p:txBody>
-          <a:bodyPr wrap="square" rtlCol="0">
-            <a:spAutoFit/>
-          </a:bodyPr>
-          <a:lstStyle/>
-          <a:p>
-            <a:r>
-              <a:rPr lang="en-US" sz="1400" dirty="0"/>
-              <a:t>Updates in location</a:t>
-            </a:r>
-          </a:p>
-        </p:txBody>
-      </p:sp>
-      <p:sp>
-        <p:nvSpPr>
           <p:cNvPr id="69" name="TextBox 68">
             <a:extLst>
               <a:ext uri="{FF2B5EF4-FFF2-40B4-BE49-F238E27FC236}">

</xml_diff>

<commit_message>
mid change of integration
</commit_message>
<xml_diff>
--- a/Notes/Structure Of Classes/Integration of Classes.pptx
+++ b/Notes/Structure Of Classes/Integration of Classes.pptx
@@ -104,6 +104,11 @@
       </a:defRPr>
     </a:lvl9pPr>
   </p:defaultTextStyle>
+  <p:extLst>
+    <p:ext uri="{EFAFB233-063F-42B5-8137-9DF3F51BA10A}">
+      <p15:sldGuideLst xmlns:p15="http://schemas.microsoft.com/office/powerpoint/2012/main"/>
+    </p:ext>
+  </p:extLst>
 </p:presentation>
 </file>
 
@@ -254,7 +259,7 @@
           <a:p>
             <a:fld id="{EFAC2891-D99D-F64B-A3B9-33B13418B0EE}" type="datetimeFigureOut">
               <a:rPr lang="en-US" smtClean="0"/>
-              <a:t>3/12/18</a:t>
+              <a:t>3/18/18</a:t>
             </a:fld>
             <a:endParaRPr lang="en-US"/>
           </a:p>
@@ -452,7 +457,7 @@
           <a:p>
             <a:fld id="{EFAC2891-D99D-F64B-A3B9-33B13418B0EE}" type="datetimeFigureOut">
               <a:rPr lang="en-US" smtClean="0"/>
-              <a:t>3/12/18</a:t>
+              <a:t>3/18/18</a:t>
             </a:fld>
             <a:endParaRPr lang="en-US"/>
           </a:p>
@@ -660,7 +665,7 @@
           <a:p>
             <a:fld id="{EFAC2891-D99D-F64B-A3B9-33B13418B0EE}" type="datetimeFigureOut">
               <a:rPr lang="en-US" smtClean="0"/>
-              <a:t>3/12/18</a:t>
+              <a:t>3/18/18</a:t>
             </a:fld>
             <a:endParaRPr lang="en-US"/>
           </a:p>
@@ -858,7 +863,7 @@
           <a:p>
             <a:fld id="{EFAC2891-D99D-F64B-A3B9-33B13418B0EE}" type="datetimeFigureOut">
               <a:rPr lang="en-US" smtClean="0"/>
-              <a:t>3/12/18</a:t>
+              <a:t>3/18/18</a:t>
             </a:fld>
             <a:endParaRPr lang="en-US"/>
           </a:p>
@@ -1133,7 +1138,7 @@
           <a:p>
             <a:fld id="{EFAC2891-D99D-F64B-A3B9-33B13418B0EE}" type="datetimeFigureOut">
               <a:rPr lang="en-US" smtClean="0"/>
-              <a:t>3/12/18</a:t>
+              <a:t>3/18/18</a:t>
             </a:fld>
             <a:endParaRPr lang="en-US"/>
           </a:p>
@@ -1398,7 +1403,7 @@
           <a:p>
             <a:fld id="{EFAC2891-D99D-F64B-A3B9-33B13418B0EE}" type="datetimeFigureOut">
               <a:rPr lang="en-US" smtClean="0"/>
-              <a:t>3/12/18</a:t>
+              <a:t>3/18/18</a:t>
             </a:fld>
             <a:endParaRPr lang="en-US"/>
           </a:p>
@@ -1810,7 +1815,7 @@
           <a:p>
             <a:fld id="{EFAC2891-D99D-F64B-A3B9-33B13418B0EE}" type="datetimeFigureOut">
               <a:rPr lang="en-US" smtClean="0"/>
-              <a:t>3/12/18</a:t>
+              <a:t>3/18/18</a:t>
             </a:fld>
             <a:endParaRPr lang="en-US"/>
           </a:p>
@@ -1951,7 +1956,7 @@
           <a:p>
             <a:fld id="{EFAC2891-D99D-F64B-A3B9-33B13418B0EE}" type="datetimeFigureOut">
               <a:rPr lang="en-US" smtClean="0"/>
-              <a:t>3/12/18</a:t>
+              <a:t>3/18/18</a:t>
             </a:fld>
             <a:endParaRPr lang="en-US"/>
           </a:p>
@@ -2064,7 +2069,7 @@
           <a:p>
             <a:fld id="{EFAC2891-D99D-F64B-A3B9-33B13418B0EE}" type="datetimeFigureOut">
               <a:rPr lang="en-US" smtClean="0"/>
-              <a:t>3/12/18</a:t>
+              <a:t>3/18/18</a:t>
             </a:fld>
             <a:endParaRPr lang="en-US"/>
           </a:p>
@@ -2375,7 +2380,7 @@
           <a:p>
             <a:fld id="{EFAC2891-D99D-F64B-A3B9-33B13418B0EE}" type="datetimeFigureOut">
               <a:rPr lang="en-US" smtClean="0"/>
-              <a:t>3/12/18</a:t>
+              <a:t>3/18/18</a:t>
             </a:fld>
             <a:endParaRPr lang="en-US"/>
           </a:p>
@@ -2663,7 +2668,7 @@
           <a:p>
             <a:fld id="{EFAC2891-D99D-F64B-A3B9-33B13418B0EE}" type="datetimeFigureOut">
               <a:rPr lang="en-US" smtClean="0"/>
-              <a:t>3/12/18</a:t>
+              <a:t>3/18/18</a:t>
             </a:fld>
             <a:endParaRPr lang="en-US"/>
           </a:p>
@@ -2904,7 +2909,7 @@
           <a:p>
             <a:fld id="{EFAC2891-D99D-F64B-A3B9-33B13418B0EE}" type="datetimeFigureOut">
               <a:rPr lang="en-US" smtClean="0"/>
-              <a:t>3/12/18</a:t>
+              <a:t>3/18/18</a:t>
             </a:fld>
             <a:endParaRPr lang="en-US"/>
           </a:p>
@@ -3384,7 +3389,7 @@
         </p:nvSpPr>
         <p:spPr>
           <a:xfrm>
-            <a:off x="3463157" y="756745"/>
+            <a:off x="3056712" y="157250"/>
             <a:ext cx="1387366" cy="735725"/>
           </a:xfrm>
           <a:prstGeom prst="rect">
@@ -3526,9 +3531,9 @@
           <p:nvPr/>
         </p:nvCxnSpPr>
         <p:spPr>
-          <a:xfrm>
-            <a:off x="2175641" y="1124608"/>
-            <a:ext cx="1287516" cy="0"/>
+          <a:xfrm flipV="1">
+            <a:off x="2175641" y="525113"/>
+            <a:ext cx="881071" cy="599495"/>
           </a:xfrm>
           <a:prstGeom prst="straightConnector1">
             <a:avLst/>
@@ -3589,10 +3594,10 @@
       </p:sp>
       <p:sp>
         <p:nvSpPr>
-          <p:cNvPr id="15" name="Rectangle 14">
-            <a:extLst>
-              <a:ext uri="{FF2B5EF4-FFF2-40B4-BE49-F238E27FC236}">
-                <a16:creationId xmlns:a16="http://schemas.microsoft.com/office/drawing/2014/main" id="{7B485B1D-C2C1-1D41-A762-25276D74D91D}"/>
+          <p:cNvPr id="16" name="Rectangle 15">
+            <a:extLst>
+              <a:ext uri="{FF2B5EF4-FFF2-40B4-BE49-F238E27FC236}">
+                <a16:creationId xmlns:a16="http://schemas.microsoft.com/office/drawing/2014/main" id="{D87BD2B3-5DF7-3443-B511-F67C2ECBE9C5}"/>
               </a:ext>
             </a:extLst>
           </p:cNvPr>
@@ -3601,7 +3606,7 @@
         </p:nvSpPr>
         <p:spPr>
           <a:xfrm>
-            <a:off x="6942082" y="1781501"/>
+            <a:off x="7172563" y="329961"/>
             <a:ext cx="1387366" cy="735725"/>
           </a:xfrm>
           <a:prstGeom prst="rect">
@@ -3631,55 +3636,6 @@
             <a:pPr algn="ctr"/>
             <a:r>
               <a:rPr lang="en-US" b="1" dirty="0"/>
-              <a:t>Job Assigner</a:t>
-            </a:r>
-          </a:p>
-        </p:txBody>
-      </p:sp>
-      <p:sp>
-        <p:nvSpPr>
-          <p:cNvPr id="16" name="Rectangle 15">
-            <a:extLst>
-              <a:ext uri="{FF2B5EF4-FFF2-40B4-BE49-F238E27FC236}">
-                <a16:creationId xmlns:a16="http://schemas.microsoft.com/office/drawing/2014/main" id="{D87BD2B3-5DF7-3443-B511-F67C2ECBE9C5}"/>
-              </a:ext>
-            </a:extLst>
-          </p:cNvPr>
-          <p:cNvSpPr/>
-          <p:nvPr/>
-        </p:nvSpPr>
-        <p:spPr>
-          <a:xfrm>
-            <a:off x="7883765" y="136560"/>
-            <a:ext cx="1387366" cy="735725"/>
-          </a:xfrm>
-          <a:prstGeom prst="rect">
-            <a:avLst/>
-          </a:prstGeom>
-        </p:spPr>
-        <p:style>
-          <a:lnRef idx="2">
-            <a:schemeClr val="accent1">
-              <a:shade val="50000"/>
-            </a:schemeClr>
-          </a:lnRef>
-          <a:fillRef idx="1">
-            <a:schemeClr val="accent1"/>
-          </a:fillRef>
-          <a:effectRef idx="0">
-            <a:schemeClr val="accent1"/>
-          </a:effectRef>
-          <a:fontRef idx="minor">
-            <a:schemeClr val="lt1"/>
-          </a:fontRef>
-        </p:style>
-        <p:txBody>
-          <a:bodyPr rtlCol="0" anchor="ctr"/>
-          <a:lstStyle/>
-          <a:p>
-            <a:pPr algn="ctr"/>
-            <a:r>
-              <a:rPr lang="en-US" b="1" dirty="0"/>
               <a:t>Networking</a:t>
             </a:r>
           </a:p>
@@ -3702,9 +3658,9 @@
           <p:nvPr/>
         </p:nvCxnSpPr>
         <p:spPr>
-          <a:xfrm flipV="1">
-            <a:off x="4850523" y="504423"/>
-            <a:ext cx="3033242" cy="620185"/>
+          <a:xfrm>
+            <a:off x="4444078" y="525113"/>
+            <a:ext cx="2728485" cy="172711"/>
           </a:xfrm>
           <a:prstGeom prst="straightConnector1">
             <a:avLst/>
@@ -3741,8 +3697,8 @@
           <p:nvPr/>
         </p:nvSpPr>
         <p:spPr>
-          <a:xfrm rot="20923067">
-            <a:off x="5139551" y="117085"/>
+          <a:xfrm rot="261029">
+            <a:off x="4575231" y="109706"/>
             <a:ext cx="2466178" cy="954107"/>
           </a:xfrm>
           <a:prstGeom prst="rect">
@@ -3763,65 +3719,22 @@
           </a:p>
         </p:txBody>
       </p:sp>
-      <p:cxnSp>
-        <p:nvCxnSpPr>
-          <p:cNvPr id="22" name="Straight Arrow Connector 21">
-            <a:extLst>
-              <a:ext uri="{FF2B5EF4-FFF2-40B4-BE49-F238E27FC236}">
-                <a16:creationId xmlns:a16="http://schemas.microsoft.com/office/drawing/2014/main" id="{FC31925A-3498-DD45-9CB8-94DB653416C9}"/>
-              </a:ext>
-            </a:extLst>
-          </p:cNvPr>
-          <p:cNvCxnSpPr>
-            <a:cxnSpLocks/>
-            <a:stCxn id="6" idx="3"/>
-            <a:endCxn id="15" idx="1"/>
-          </p:cNvCxnSpPr>
+      <p:sp>
+        <p:nvSpPr>
+          <p:cNvPr id="109" name="TextBox 108">
+            <a:extLst>
+              <a:ext uri="{FF2B5EF4-FFF2-40B4-BE49-F238E27FC236}">
+                <a16:creationId xmlns:a16="http://schemas.microsoft.com/office/drawing/2014/main" id="{414C2711-D23F-A64D-8EC0-E6DCEA8C70D7}"/>
+              </a:ext>
+            </a:extLst>
+          </p:cNvPr>
+          <p:cNvSpPr txBox="1"/>
           <p:nvPr/>
-        </p:nvCxnSpPr>
+        </p:nvSpPr>
         <p:spPr>
           <a:xfrm>
-            <a:off x="4850523" y="1124608"/>
-            <a:ext cx="2091559" cy="1024756"/>
-          </a:xfrm>
-          <a:prstGeom prst="straightConnector1">
-            <a:avLst/>
-          </a:prstGeom>
-          <a:ln>
-            <a:tailEnd type="triangle"/>
-          </a:ln>
-        </p:spPr>
-        <p:style>
-          <a:lnRef idx="1">
-            <a:schemeClr val="accent2"/>
-          </a:lnRef>
-          <a:fillRef idx="0">
-            <a:schemeClr val="accent2"/>
-          </a:fillRef>
-          <a:effectRef idx="0">
-            <a:schemeClr val="accent2"/>
-          </a:effectRef>
-          <a:fontRef idx="minor">
-            <a:schemeClr val="tx1"/>
-          </a:fontRef>
-        </p:style>
-      </p:cxnSp>
-      <p:sp>
-        <p:nvSpPr>
-          <p:cNvPr id="24" name="TextBox 23">
-            <a:extLst>
-              <a:ext uri="{FF2B5EF4-FFF2-40B4-BE49-F238E27FC236}">
-                <a16:creationId xmlns:a16="http://schemas.microsoft.com/office/drawing/2014/main" id="{9237443F-23DB-D345-AC0C-560DAD7E4662}"/>
-              </a:ext>
-            </a:extLst>
-          </p:cNvPr>
-          <p:cNvSpPr txBox="1"/>
-          <p:nvPr/>
-        </p:nvSpPr>
-        <p:spPr>
-          <a:xfrm rot="1570501">
-            <a:off x="5186853" y="1665781"/>
-            <a:ext cx="1418896" cy="523220"/>
+            <a:off x="7813433" y="5981867"/>
+            <a:ext cx="1031636" cy="1046440"/>
           </a:xfrm>
           <a:prstGeom prst="rect">
             <a:avLst/>
@@ -3835,151 +3748,68 @@
           <a:lstStyle/>
           <a:p>
             <a:r>
-              <a:rPr lang="en-US" sz="1400" dirty="0"/>
-              <a:t>Passes it the network class</a:t>
-            </a:r>
-          </a:p>
-        </p:txBody>
-      </p:sp>
-      <p:cxnSp>
-        <p:nvCxnSpPr>
-          <p:cNvPr id="26" name="Straight Connector 25">
-            <a:extLst>
-              <a:ext uri="{FF2B5EF4-FFF2-40B4-BE49-F238E27FC236}">
-                <a16:creationId xmlns:a16="http://schemas.microsoft.com/office/drawing/2014/main" id="{D2078256-0917-6E4A-8447-1DD17B533820}"/>
-              </a:ext>
-            </a:extLst>
-          </p:cNvPr>
-          <p:cNvCxnSpPr>
-            <a:cxnSpLocks/>
-            <a:stCxn id="15" idx="3"/>
-            <a:endCxn id="28" idx="1"/>
-          </p:cNvCxnSpPr>
+              <a:rPr lang="en-US" sz="1100" dirty="0"/>
+              <a:t>1</a:t>
+            </a:r>
+            <a:r>
+              <a:rPr lang="en-US" sz="1100" baseline="30000" dirty="0"/>
+              <a:t>st</a:t>
+            </a:r>
+            <a:endParaRPr lang="en-US" sz="1100" dirty="0"/>
+          </a:p>
+          <a:p>
+            <a:r>
+              <a:rPr lang="en-US" sz="1100" dirty="0"/>
+              <a:t>2</a:t>
+            </a:r>
+            <a:r>
+              <a:rPr lang="en-US" sz="1100" baseline="30000" dirty="0"/>
+              <a:t>nd</a:t>
+            </a:r>
+            <a:endParaRPr lang="en-US" sz="1100" dirty="0"/>
+          </a:p>
+          <a:p>
+            <a:r>
+              <a:rPr lang="en-US" sz="1100" dirty="0"/>
+              <a:t>3</a:t>
+            </a:r>
+            <a:r>
+              <a:rPr lang="en-US" sz="1100" baseline="30000" dirty="0"/>
+              <a:t>rd</a:t>
+            </a:r>
+            <a:endParaRPr lang="en-US" sz="1100" dirty="0"/>
+          </a:p>
+          <a:p>
+            <a:r>
+              <a:rPr lang="en-US" sz="1100" dirty="0"/>
+              <a:t>4</a:t>
+            </a:r>
+            <a:r>
+              <a:rPr lang="en-US" sz="1100" baseline="30000" dirty="0"/>
+              <a:t>th</a:t>
+            </a:r>
+            <a:endParaRPr lang="en-US" sz="1100" dirty="0"/>
+          </a:p>
+          <a:p>
+            <a:endParaRPr lang="en-US" dirty="0"/>
+          </a:p>
+        </p:txBody>
+      </p:sp>
+      <p:sp>
+        <p:nvSpPr>
+          <p:cNvPr id="82" name="Rectangle 81">
+            <a:extLst>
+              <a:ext uri="{FF2B5EF4-FFF2-40B4-BE49-F238E27FC236}">
+                <a16:creationId xmlns:a16="http://schemas.microsoft.com/office/drawing/2014/main" id="{9B69FDB1-4702-AD45-829F-60279D073BC9}"/>
+              </a:ext>
+            </a:extLst>
+          </p:cNvPr>
+          <p:cNvSpPr/>
           <p:nvPr/>
-        </p:nvCxnSpPr>
+        </p:nvSpPr>
         <p:spPr>
           <a:xfrm>
-            <a:off x="8329448" y="2149364"/>
-            <a:ext cx="1975945" cy="0"/>
-          </a:xfrm>
-          <a:prstGeom prst="line">
-            <a:avLst/>
-          </a:prstGeom>
-        </p:spPr>
-        <p:style>
-          <a:lnRef idx="1">
-            <a:schemeClr val="accent1"/>
-          </a:lnRef>
-          <a:fillRef idx="0">
-            <a:schemeClr val="accent1"/>
-          </a:fillRef>
-          <a:effectRef idx="0">
-            <a:schemeClr val="accent1"/>
-          </a:effectRef>
-          <a:fontRef idx="minor">
-            <a:schemeClr val="tx1"/>
-          </a:fontRef>
-        </p:style>
-      </p:cxnSp>
-      <p:sp>
-        <p:nvSpPr>
-          <p:cNvPr id="28" name="Rectangle 27">
-            <a:extLst>
-              <a:ext uri="{FF2B5EF4-FFF2-40B4-BE49-F238E27FC236}">
-                <a16:creationId xmlns:a16="http://schemas.microsoft.com/office/drawing/2014/main" id="{A5B45295-5045-D34D-8DEB-EECA6FEEF569}"/>
-              </a:ext>
-            </a:extLst>
-          </p:cNvPr>
-          <p:cNvSpPr/>
-          <p:nvPr/>
-        </p:nvSpPr>
-        <p:spPr>
-          <a:xfrm>
-            <a:off x="10305393" y="1781501"/>
-            <a:ext cx="1439917" cy="735725"/>
-          </a:xfrm>
-          <a:prstGeom prst="rect">
-            <a:avLst/>
-          </a:prstGeom>
-        </p:spPr>
-        <p:style>
-          <a:lnRef idx="2">
-            <a:schemeClr val="accent1">
-              <a:shade val="50000"/>
-            </a:schemeClr>
-          </a:lnRef>
-          <a:fillRef idx="1">
-            <a:schemeClr val="accent1"/>
-          </a:fillRef>
-          <a:effectRef idx="0">
-            <a:schemeClr val="accent1"/>
-          </a:effectRef>
-          <a:fontRef idx="minor">
-            <a:schemeClr val="lt1"/>
-          </a:fontRef>
-        </p:style>
-        <p:txBody>
-          <a:bodyPr rtlCol="0" anchor="ctr"/>
-          <a:lstStyle/>
-          <a:p>
-            <a:pPr algn="ctr"/>
-            <a:r>
-              <a:rPr lang="en-US" dirty="0"/>
-              <a:t>Networking</a:t>
-            </a:r>
-          </a:p>
-        </p:txBody>
-      </p:sp>
-      <p:sp>
-        <p:nvSpPr>
-          <p:cNvPr id="29" name="TextBox 28">
-            <a:extLst>
-              <a:ext uri="{FF2B5EF4-FFF2-40B4-BE49-F238E27FC236}">
-                <a16:creationId xmlns:a16="http://schemas.microsoft.com/office/drawing/2014/main" id="{AE33EA88-3E21-884E-8153-79DA2D7BE6D5}"/>
-              </a:ext>
-            </a:extLst>
-          </p:cNvPr>
-          <p:cNvSpPr txBox="1"/>
-          <p:nvPr/>
-        </p:nvSpPr>
-        <p:spPr>
-          <a:xfrm>
-            <a:off x="8374731" y="1447772"/>
-            <a:ext cx="1975945" cy="954107"/>
-          </a:xfrm>
-          <a:prstGeom prst="rect">
-            <a:avLst/>
-          </a:prstGeom>
-          <a:noFill/>
-        </p:spPr>
-        <p:txBody>
-          <a:bodyPr wrap="square" rtlCol="0">
-            <a:spAutoFit/>
-          </a:bodyPr>
-          <a:lstStyle/>
-          <a:p>
-            <a:r>
-              <a:rPr lang="en-US" sz="1400" dirty="0"/>
-              <a:t>Passes itself to networking so that networking can call job assigner</a:t>
-            </a:r>
-          </a:p>
-        </p:txBody>
-      </p:sp>
-      <p:sp>
-        <p:nvSpPr>
-          <p:cNvPr id="31" name="Rectangle 30">
-            <a:extLst>
-              <a:ext uri="{FF2B5EF4-FFF2-40B4-BE49-F238E27FC236}">
-                <a16:creationId xmlns:a16="http://schemas.microsoft.com/office/drawing/2014/main" id="{1A5C63E0-4E17-7546-AC4A-B972F29991F6}"/>
-              </a:ext>
-            </a:extLst>
-          </p:cNvPr>
-          <p:cNvSpPr/>
-          <p:nvPr/>
-        </p:nvSpPr>
-        <p:spPr>
-          <a:xfrm>
-            <a:off x="8546923" y="3636579"/>
+            <a:off x="10516170" y="356236"/>
             <a:ext cx="1450428" cy="683173"/>
           </a:xfrm>
           <a:prstGeom prst="rect">
@@ -4009,364 +3839,30 @@
             <a:pPr algn="ctr"/>
             <a:r>
               <a:rPr lang="en-US" dirty="0"/>
-              <a:t>Networking</a:t>
-            </a:r>
-          </a:p>
-        </p:txBody>
-      </p:sp>
-      <p:sp>
-        <p:nvSpPr>
-          <p:cNvPr id="35" name="TextBox 34">
-            <a:extLst>
-              <a:ext uri="{FF2B5EF4-FFF2-40B4-BE49-F238E27FC236}">
-                <a16:creationId xmlns:a16="http://schemas.microsoft.com/office/drawing/2014/main" id="{89CFF39F-DC56-9741-982C-34DF7D2A99F1}"/>
-              </a:ext>
-            </a:extLst>
-          </p:cNvPr>
-          <p:cNvSpPr txBox="1"/>
-          <p:nvPr/>
-        </p:nvSpPr>
-        <p:spPr>
-          <a:xfrm rot="2111937">
-            <a:off x="7605917" y="2870778"/>
-            <a:ext cx="1975945" cy="523220"/>
-          </a:xfrm>
-          <a:prstGeom prst="rect">
-            <a:avLst/>
-          </a:prstGeom>
-          <a:noFill/>
-        </p:spPr>
-        <p:txBody>
-          <a:bodyPr wrap="square" rtlCol="0">
-            <a:spAutoFit/>
-          </a:bodyPr>
-          <a:lstStyle/>
-          <a:p>
-            <a:r>
-              <a:rPr lang="en-US" sz="1400" dirty="0"/>
-              <a:t>Asks for available robots and their locations</a:t>
+              <a:t>Map</a:t>
             </a:r>
           </a:p>
         </p:txBody>
       </p:sp>
       <p:cxnSp>
         <p:nvCxnSpPr>
-          <p:cNvPr id="39" name="Straight Arrow Connector 38">
-            <a:extLst>
-              <a:ext uri="{FF2B5EF4-FFF2-40B4-BE49-F238E27FC236}">
-                <a16:creationId xmlns:a16="http://schemas.microsoft.com/office/drawing/2014/main" id="{BD125A88-3296-3F48-B4AC-505DF8C8439A}"/>
+          <p:cNvPr id="68" name="Straight Arrow Connector 67">
+            <a:extLst>
+              <a:ext uri="{FF2B5EF4-FFF2-40B4-BE49-F238E27FC236}">
+                <a16:creationId xmlns:a16="http://schemas.microsoft.com/office/drawing/2014/main" id="{8B47C541-274C-C543-9742-0CA56CBF85F9}"/>
               </a:ext>
             </a:extLst>
           </p:cNvPr>
           <p:cNvCxnSpPr>
-            <a:stCxn id="15" idx="2"/>
-            <a:endCxn id="31" idx="0"/>
+            <a:stCxn id="16" idx="3"/>
+            <a:endCxn id="82" idx="1"/>
           </p:cNvCxnSpPr>
           <p:nvPr/>
         </p:nvCxnSpPr>
         <p:spPr>
-          <a:xfrm>
-            <a:off x="7635765" y="2517226"/>
-            <a:ext cx="1636372" cy="1119353"/>
-          </a:xfrm>
-          <a:prstGeom prst="straightConnector1">
-            <a:avLst/>
-          </a:prstGeom>
-          <a:ln>
-            <a:headEnd type="triangle"/>
-            <a:tailEnd type="triangle"/>
-          </a:ln>
-        </p:spPr>
-        <p:style>
-          <a:lnRef idx="1">
-            <a:schemeClr val="accent2"/>
-          </a:lnRef>
-          <a:fillRef idx="0">
-            <a:schemeClr val="accent2"/>
-          </a:fillRef>
-          <a:effectRef idx="0">
-            <a:schemeClr val="accent2"/>
-          </a:effectRef>
-          <a:fontRef idx="minor">
-            <a:schemeClr val="tx1"/>
-          </a:fontRef>
-        </p:style>
-      </p:cxnSp>
-      <p:cxnSp>
-        <p:nvCxnSpPr>
-          <p:cNvPr id="43" name="Straight Arrow Connector 42">
-            <a:extLst>
-              <a:ext uri="{FF2B5EF4-FFF2-40B4-BE49-F238E27FC236}">
-                <a16:creationId xmlns:a16="http://schemas.microsoft.com/office/drawing/2014/main" id="{AD5D9002-AA24-444B-9BE6-10293D867E7C}"/>
-              </a:ext>
-            </a:extLst>
-          </p:cNvPr>
-          <p:cNvCxnSpPr>
-            <a:cxnSpLocks/>
-            <a:stCxn id="15" idx="2"/>
-            <a:endCxn id="44" idx="0"/>
-          </p:cNvCxnSpPr>
-          <p:nvPr/>
-        </p:nvCxnSpPr>
-        <p:spPr>
-          <a:xfrm>
-            <a:off x="7635765" y="2517226"/>
-            <a:ext cx="13752" cy="1785220"/>
-          </a:xfrm>
-          <a:prstGeom prst="straightConnector1">
-            <a:avLst/>
-          </a:prstGeom>
-          <a:ln>
-            <a:headEnd type="triangle"/>
-            <a:tailEnd type="triangle"/>
-          </a:ln>
-        </p:spPr>
-        <p:style>
-          <a:lnRef idx="1">
-            <a:schemeClr val="accent3"/>
-          </a:lnRef>
-          <a:fillRef idx="0">
-            <a:schemeClr val="accent3"/>
-          </a:fillRef>
-          <a:effectRef idx="0">
-            <a:schemeClr val="accent3"/>
-          </a:effectRef>
-          <a:fontRef idx="minor">
-            <a:schemeClr val="tx1"/>
-          </a:fontRef>
-        </p:style>
-      </p:cxnSp>
-      <p:sp>
-        <p:nvSpPr>
-          <p:cNvPr id="44" name="Rectangle 43">
-            <a:extLst>
-              <a:ext uri="{FF2B5EF4-FFF2-40B4-BE49-F238E27FC236}">
-                <a16:creationId xmlns:a16="http://schemas.microsoft.com/office/drawing/2014/main" id="{5047A7FC-6419-684F-93E8-DA1FFA69E1DF}"/>
-              </a:ext>
-            </a:extLst>
-          </p:cNvPr>
-          <p:cNvSpPr/>
-          <p:nvPr/>
-        </p:nvSpPr>
-        <p:spPr>
-          <a:xfrm>
-            <a:off x="6924303" y="4302446"/>
-            <a:ext cx="1450428" cy="683173"/>
-          </a:xfrm>
-          <a:prstGeom prst="rect">
-            <a:avLst/>
-          </a:prstGeom>
-        </p:spPr>
-        <p:style>
-          <a:lnRef idx="2">
-            <a:schemeClr val="accent1">
-              <a:shade val="50000"/>
-            </a:schemeClr>
-          </a:lnRef>
-          <a:fillRef idx="1">
-            <a:schemeClr val="accent1"/>
-          </a:fillRef>
-          <a:effectRef idx="0">
-            <a:schemeClr val="accent1"/>
-          </a:effectRef>
-          <a:fontRef idx="minor">
-            <a:schemeClr val="lt1"/>
-          </a:fontRef>
-        </p:style>
-        <p:txBody>
-          <a:bodyPr rtlCol="0" anchor="ctr"/>
-          <a:lstStyle/>
-          <a:p>
-            <a:pPr algn="ctr"/>
-            <a:r>
-              <a:rPr lang="en-US" dirty="0" err="1"/>
-              <a:t>RoutePlanner</a:t>
-            </a:r>
-            <a:endParaRPr lang="en-US" dirty="0"/>
-          </a:p>
-        </p:txBody>
-      </p:sp>
-      <p:sp>
-        <p:nvSpPr>
-          <p:cNvPr id="48" name="TextBox 47">
-            <a:extLst>
-              <a:ext uri="{FF2B5EF4-FFF2-40B4-BE49-F238E27FC236}">
-                <a16:creationId xmlns:a16="http://schemas.microsoft.com/office/drawing/2014/main" id="{56C50172-4F7E-B245-9EC9-16C043305473}"/>
-              </a:ext>
-            </a:extLst>
-          </p:cNvPr>
-          <p:cNvSpPr txBox="1"/>
-          <p:nvPr/>
-        </p:nvSpPr>
-        <p:spPr>
-          <a:xfrm rot="16200000">
-            <a:off x="6772231" y="3240022"/>
-            <a:ext cx="1418896" cy="307777"/>
-          </a:xfrm>
-          <a:prstGeom prst="rect">
-            <a:avLst/>
-          </a:prstGeom>
-          <a:noFill/>
-        </p:spPr>
-        <p:txBody>
-          <a:bodyPr wrap="square" rtlCol="0">
-            <a:spAutoFit/>
-          </a:bodyPr>
-          <a:lstStyle/>
-          <a:p>
-            <a:r>
-              <a:rPr lang="en-US" sz="1400" dirty="0"/>
-              <a:t>Asks for route </a:t>
-            </a:r>
-          </a:p>
-        </p:txBody>
-      </p:sp>
-      <p:sp>
-        <p:nvSpPr>
-          <p:cNvPr id="50" name="Rectangle 49">
-            <a:extLst>
-              <a:ext uri="{FF2B5EF4-FFF2-40B4-BE49-F238E27FC236}">
-                <a16:creationId xmlns:a16="http://schemas.microsoft.com/office/drawing/2014/main" id="{AAC56DF6-C1AB-8849-9DBC-5EC8411A791D}"/>
-              </a:ext>
-            </a:extLst>
-          </p:cNvPr>
-          <p:cNvSpPr/>
-          <p:nvPr/>
-        </p:nvSpPr>
-        <p:spPr>
-          <a:xfrm>
-            <a:off x="4916716" y="3636579"/>
-            <a:ext cx="1450428" cy="683173"/>
-          </a:xfrm>
-          <a:prstGeom prst="rect">
-            <a:avLst/>
-          </a:prstGeom>
-        </p:spPr>
-        <p:style>
-          <a:lnRef idx="2">
-            <a:schemeClr val="accent1">
-              <a:shade val="50000"/>
-            </a:schemeClr>
-          </a:lnRef>
-          <a:fillRef idx="1">
-            <a:schemeClr val="accent1"/>
-          </a:fillRef>
-          <a:effectRef idx="0">
-            <a:schemeClr val="accent1"/>
-          </a:effectRef>
-          <a:fontRef idx="minor">
-            <a:schemeClr val="lt1"/>
-          </a:fontRef>
-        </p:style>
-        <p:txBody>
-          <a:bodyPr rtlCol="0" anchor="ctr"/>
-          <a:lstStyle/>
-          <a:p>
-            <a:pPr algn="ctr"/>
-            <a:r>
-              <a:rPr lang="en-US" dirty="0"/>
-              <a:t>Networking</a:t>
-            </a:r>
-          </a:p>
-        </p:txBody>
-      </p:sp>
-      <p:cxnSp>
-        <p:nvCxnSpPr>
-          <p:cNvPr id="52" name="Straight Arrow Connector 51">
-            <a:extLst>
-              <a:ext uri="{FF2B5EF4-FFF2-40B4-BE49-F238E27FC236}">
-                <a16:creationId xmlns:a16="http://schemas.microsoft.com/office/drawing/2014/main" id="{4584850E-368A-5146-9D2C-B66CC9FA745A}"/>
-              </a:ext>
-            </a:extLst>
-          </p:cNvPr>
-          <p:cNvCxnSpPr>
-            <a:stCxn id="15" idx="2"/>
-            <a:endCxn id="50" idx="0"/>
-          </p:cNvCxnSpPr>
-          <p:nvPr/>
-        </p:nvCxnSpPr>
-        <p:spPr>
-          <a:xfrm flipH="1">
-            <a:off x="5641930" y="2517226"/>
-            <a:ext cx="1993835" cy="1119353"/>
-          </a:xfrm>
-          <a:prstGeom prst="straightConnector1">
-            <a:avLst/>
-          </a:prstGeom>
-          <a:ln>
-            <a:tailEnd type="triangle"/>
-          </a:ln>
-        </p:spPr>
-        <p:style>
-          <a:lnRef idx="1">
-            <a:schemeClr val="accent6"/>
-          </a:lnRef>
-          <a:fillRef idx="0">
-            <a:schemeClr val="accent6"/>
-          </a:fillRef>
-          <a:effectRef idx="0">
-            <a:schemeClr val="accent6"/>
-          </a:effectRef>
-          <a:fontRef idx="minor">
-            <a:schemeClr val="tx1"/>
-          </a:fontRef>
-        </p:style>
-      </p:cxnSp>
-      <p:sp>
-        <p:nvSpPr>
-          <p:cNvPr id="53" name="TextBox 52">
-            <a:extLst>
-              <a:ext uri="{FF2B5EF4-FFF2-40B4-BE49-F238E27FC236}">
-                <a16:creationId xmlns:a16="http://schemas.microsoft.com/office/drawing/2014/main" id="{FF55A187-93A6-144F-BDC9-5DA865EA62F4}"/>
-              </a:ext>
-            </a:extLst>
-          </p:cNvPr>
-          <p:cNvSpPr txBox="1"/>
-          <p:nvPr/>
-        </p:nvSpPr>
-        <p:spPr>
-          <a:xfrm rot="19828799">
-            <a:off x="5798805" y="2681262"/>
-            <a:ext cx="1418896" cy="738664"/>
-          </a:xfrm>
-          <a:prstGeom prst="rect">
-            <a:avLst/>
-          </a:prstGeom>
-          <a:noFill/>
-        </p:spPr>
-        <p:txBody>
-          <a:bodyPr wrap="square" rtlCol="0">
-            <a:spAutoFit/>
-          </a:bodyPr>
-          <a:lstStyle/>
-          <a:p>
-            <a:r>
-              <a:rPr lang="en-US" sz="1400" dirty="0"/>
-              <a:t>Passes it the route and robot ID</a:t>
-            </a:r>
-          </a:p>
-        </p:txBody>
-      </p:sp>
-      <p:cxnSp>
-        <p:nvCxnSpPr>
-          <p:cNvPr id="55" name="Straight Arrow Connector 54">
-            <a:extLst>
-              <a:ext uri="{FF2B5EF4-FFF2-40B4-BE49-F238E27FC236}">
-                <a16:creationId xmlns:a16="http://schemas.microsoft.com/office/drawing/2014/main" id="{353995A4-E051-5A49-BA49-EFB5563F9A97}"/>
-              </a:ext>
-            </a:extLst>
-          </p:cNvPr>
-          <p:cNvCxnSpPr>
-            <a:cxnSpLocks/>
-            <a:stCxn id="50" idx="1"/>
-            <a:endCxn id="56" idx="3"/>
-          </p:cNvCxnSpPr>
-          <p:nvPr/>
-        </p:nvCxnSpPr>
-        <p:spPr>
-          <a:xfrm flipH="1">
-            <a:off x="3289737" y="3978166"/>
-            <a:ext cx="1626979" cy="6916"/>
+          <a:xfrm flipV="1">
+            <a:off x="8559929" y="697823"/>
+            <a:ext cx="1956241" cy="1"/>
           </a:xfrm>
           <a:prstGeom prst="straightConnector1">
             <a:avLst/>
@@ -4392,10 +3888,45 @@
       </p:cxnSp>
       <p:sp>
         <p:nvSpPr>
-          <p:cNvPr id="56" name="Rectangle 55">
-            <a:extLst>
-              <a:ext uri="{FF2B5EF4-FFF2-40B4-BE49-F238E27FC236}">
-                <a16:creationId xmlns:a16="http://schemas.microsoft.com/office/drawing/2014/main" id="{95D73C0B-9CE4-3A46-AEAB-9550057EB239}"/>
+          <p:cNvPr id="87" name="TextBox 86">
+            <a:extLst>
+              <a:ext uri="{FF2B5EF4-FFF2-40B4-BE49-F238E27FC236}">
+                <a16:creationId xmlns:a16="http://schemas.microsoft.com/office/drawing/2014/main" id="{7D01D73F-F8B9-4940-B090-F2778C42483E}"/>
+              </a:ext>
+            </a:extLst>
+          </p:cNvPr>
+          <p:cNvSpPr txBox="1"/>
+          <p:nvPr/>
+        </p:nvSpPr>
+        <p:spPr>
+          <a:xfrm>
+            <a:off x="8849375" y="190892"/>
+            <a:ext cx="1418896" cy="738664"/>
+          </a:xfrm>
+          <a:prstGeom prst="rect">
+            <a:avLst/>
+          </a:prstGeom>
+          <a:noFill/>
+        </p:spPr>
+        <p:txBody>
+          <a:bodyPr wrap="square" rtlCol="0">
+            <a:spAutoFit/>
+          </a:bodyPr>
+          <a:lstStyle/>
+          <a:p>
+            <a:r>
+              <a:rPr lang="en-US" sz="1400" dirty="0"/>
+              <a:t>Create map to update robot locations</a:t>
+            </a:r>
+          </a:p>
+        </p:txBody>
+      </p:sp>
+      <p:sp>
+        <p:nvSpPr>
+          <p:cNvPr id="89" name="Rectangle 88">
+            <a:extLst>
+              <a:ext uri="{FF2B5EF4-FFF2-40B4-BE49-F238E27FC236}">
+                <a16:creationId xmlns:a16="http://schemas.microsoft.com/office/drawing/2014/main" id="{F17F3BDD-3043-CC47-B40C-802AB0257907}"/>
               </a:ext>
             </a:extLst>
           </p:cNvPr>
@@ -4404,8 +3935,8 @@
         </p:nvSpPr>
         <p:spPr>
           <a:xfrm>
-            <a:off x="1839309" y="3643495"/>
-            <a:ext cx="1450428" cy="683173"/>
+            <a:off x="10553392" y="1392530"/>
+            <a:ext cx="1387366" cy="735725"/>
           </a:xfrm>
           <a:prstGeom prst="rect">
             <a:avLst/>
@@ -4433,164 +3964,31 @@
           <a:p>
             <a:pPr algn="ctr"/>
             <a:r>
-              <a:rPr lang="en-US" dirty="0"/>
-              <a:t>Robot</a:t>
-            </a:r>
-          </a:p>
-        </p:txBody>
-      </p:sp>
-      <p:sp>
-        <p:nvSpPr>
-          <p:cNvPr id="61" name="TextBox 60">
-            <a:extLst>
-              <a:ext uri="{FF2B5EF4-FFF2-40B4-BE49-F238E27FC236}">
-                <a16:creationId xmlns:a16="http://schemas.microsoft.com/office/drawing/2014/main" id="{70637422-913D-734B-AB72-546F31F6CDA5}"/>
-              </a:ext>
-            </a:extLst>
-          </p:cNvPr>
-          <p:cNvSpPr txBox="1"/>
-          <p:nvPr/>
-        </p:nvSpPr>
-        <p:spPr>
-          <a:xfrm>
-            <a:off x="3447392" y="3420122"/>
-            <a:ext cx="1418896" cy="523220"/>
-          </a:xfrm>
-          <a:prstGeom prst="rect">
-            <a:avLst/>
-          </a:prstGeom>
-          <a:noFill/>
-        </p:spPr>
-        <p:txBody>
-          <a:bodyPr wrap="square" rtlCol="0">
-            <a:spAutoFit/>
-          </a:bodyPr>
-          <a:lstStyle/>
-          <a:p>
-            <a:r>
-              <a:rPr lang="en-US" sz="1400" dirty="0"/>
-              <a:t>Passes it instructions</a:t>
-            </a:r>
-          </a:p>
-        </p:txBody>
-      </p:sp>
-      <p:sp>
-        <p:nvSpPr>
-          <p:cNvPr id="62" name="Rectangle 61">
-            <a:extLst>
-              <a:ext uri="{FF2B5EF4-FFF2-40B4-BE49-F238E27FC236}">
-                <a16:creationId xmlns:a16="http://schemas.microsoft.com/office/drawing/2014/main" id="{62BCC6B5-FCC2-F541-9006-3F8FEE02D48F}"/>
-              </a:ext>
-            </a:extLst>
-          </p:cNvPr>
-          <p:cNvSpPr/>
-          <p:nvPr/>
-        </p:nvSpPr>
-        <p:spPr>
-          <a:xfrm>
-            <a:off x="356846" y="6121210"/>
-            <a:ext cx="1450428" cy="683173"/>
-          </a:xfrm>
-          <a:prstGeom prst="rect">
-            <a:avLst/>
-          </a:prstGeom>
-        </p:spPr>
-        <p:style>
-          <a:lnRef idx="2">
-            <a:schemeClr val="accent1">
-              <a:shade val="50000"/>
-            </a:schemeClr>
-          </a:lnRef>
-          <a:fillRef idx="1">
-            <a:schemeClr val="accent1"/>
-          </a:fillRef>
-          <a:effectRef idx="0">
-            <a:schemeClr val="accent1"/>
-          </a:effectRef>
-          <a:fontRef idx="minor">
-            <a:schemeClr val="lt1"/>
-          </a:fontRef>
-        </p:style>
-        <p:txBody>
-          <a:bodyPr rtlCol="0" anchor="ctr"/>
-          <a:lstStyle/>
-          <a:p>
-            <a:pPr algn="ctr"/>
-            <a:r>
-              <a:rPr lang="en-US" dirty="0"/>
+              <a:rPr lang="en-US" b="1" dirty="0"/>
               <a:t>Job Assigner</a:t>
-            </a:r>
-          </a:p>
-        </p:txBody>
-      </p:sp>
-      <p:sp>
-        <p:nvSpPr>
-          <p:cNvPr id="63" name="Rectangle 62">
-            <a:extLst>
-              <a:ext uri="{FF2B5EF4-FFF2-40B4-BE49-F238E27FC236}">
-                <a16:creationId xmlns:a16="http://schemas.microsoft.com/office/drawing/2014/main" id="{F540EF87-F60F-7348-8B36-C2C8BBB6C751}"/>
-              </a:ext>
-            </a:extLst>
-          </p:cNvPr>
-          <p:cNvSpPr/>
-          <p:nvPr/>
-        </p:nvSpPr>
-        <p:spPr>
-          <a:xfrm>
-            <a:off x="329714" y="4914857"/>
-            <a:ext cx="1450428" cy="683173"/>
-          </a:xfrm>
-          <a:prstGeom prst="rect">
-            <a:avLst/>
-          </a:prstGeom>
-        </p:spPr>
-        <p:style>
-          <a:lnRef idx="2">
-            <a:schemeClr val="accent1">
-              <a:shade val="50000"/>
-            </a:schemeClr>
-          </a:lnRef>
-          <a:fillRef idx="1">
-            <a:schemeClr val="accent1"/>
-          </a:fillRef>
-          <a:effectRef idx="0">
-            <a:schemeClr val="accent1"/>
-          </a:effectRef>
-          <a:fontRef idx="minor">
-            <a:schemeClr val="lt1"/>
-          </a:fontRef>
-        </p:style>
-        <p:txBody>
-          <a:bodyPr rtlCol="0" anchor="ctr"/>
-          <a:lstStyle/>
-          <a:p>
-            <a:pPr algn="ctr"/>
-            <a:r>
-              <a:rPr lang="en-US" dirty="0"/>
-              <a:t>Networking</a:t>
             </a:r>
           </a:p>
         </p:txBody>
       </p:sp>
       <p:cxnSp>
         <p:nvCxnSpPr>
-          <p:cNvPr id="65" name="Straight Arrow Connector 64">
-            <a:extLst>
-              <a:ext uri="{FF2B5EF4-FFF2-40B4-BE49-F238E27FC236}">
-                <a16:creationId xmlns:a16="http://schemas.microsoft.com/office/drawing/2014/main" id="{452FDB96-C683-8242-94DF-EDCE5B72A430}"/>
+          <p:cNvPr id="91" name="Straight Arrow Connector 90">
+            <a:extLst>
+              <a:ext uri="{FF2B5EF4-FFF2-40B4-BE49-F238E27FC236}">
+                <a16:creationId xmlns:a16="http://schemas.microsoft.com/office/drawing/2014/main" id="{283DCFBC-F498-974F-8EA2-15AF21B2912A}"/>
               </a:ext>
             </a:extLst>
           </p:cNvPr>
           <p:cNvCxnSpPr>
-            <a:stCxn id="56" idx="2"/>
-            <a:endCxn id="63" idx="0"/>
+            <a:cxnSpLocks/>
+            <a:endCxn id="89" idx="1"/>
           </p:cNvCxnSpPr>
           <p:nvPr/>
         </p:nvCxnSpPr>
         <p:spPr>
-          <a:xfrm flipH="1">
-            <a:off x="1054928" y="4326668"/>
-            <a:ext cx="1509595" cy="588189"/>
+          <a:xfrm>
+            <a:off x="8523678" y="1065188"/>
+            <a:ext cx="2029714" cy="695205"/>
           </a:xfrm>
           <a:prstGeom prst="straightConnector1">
             <a:avLst/>
@@ -4616,10 +4014,10 @@
       </p:cxnSp>
       <p:sp>
         <p:nvSpPr>
-          <p:cNvPr id="66" name="TextBox 65">
-            <a:extLst>
-              <a:ext uri="{FF2B5EF4-FFF2-40B4-BE49-F238E27FC236}">
-                <a16:creationId xmlns:a16="http://schemas.microsoft.com/office/drawing/2014/main" id="{9943E9A0-C839-8043-80AF-7224725CCD72}"/>
+          <p:cNvPr id="94" name="TextBox 93">
+            <a:extLst>
+              <a:ext uri="{FF2B5EF4-FFF2-40B4-BE49-F238E27FC236}">
+                <a16:creationId xmlns:a16="http://schemas.microsoft.com/office/drawing/2014/main" id="{DDFAD904-6BE5-4F49-A7AC-D911DECB89DF}"/>
               </a:ext>
             </a:extLst>
           </p:cNvPr>
@@ -4627,9 +4025,9 @@
           <p:nvPr/>
         </p:nvSpPr>
         <p:spPr>
-          <a:xfrm>
-            <a:off x="6372802" y="5270073"/>
-            <a:ext cx="1418896" cy="523220"/>
+          <a:xfrm rot="1139259">
+            <a:off x="8701364" y="1158290"/>
+            <a:ext cx="1418896" cy="738664"/>
           </a:xfrm>
           <a:prstGeom prst="rect">
             <a:avLst/>
@@ -4644,179 +4042,31 @@
           <a:p>
             <a:r>
               <a:rPr lang="en-US" sz="1400" dirty="0"/>
-              <a:t>Tells robot that it has reached goal</a:t>
-            </a:r>
-          </a:p>
-        </p:txBody>
-      </p:sp>
-      <p:sp>
-        <p:nvSpPr>
-          <p:cNvPr id="67" name="TextBox 66">
-            <a:extLst>
-              <a:ext uri="{FF2B5EF4-FFF2-40B4-BE49-F238E27FC236}">
-                <a16:creationId xmlns:a16="http://schemas.microsoft.com/office/drawing/2014/main" id="{045B2E96-C8A8-BA48-86AF-3DCA706E0D50}"/>
-              </a:ext>
-            </a:extLst>
-          </p:cNvPr>
-          <p:cNvSpPr txBox="1"/>
-          <p:nvPr/>
-        </p:nvSpPr>
-        <p:spPr>
-          <a:xfrm rot="2298516">
-            <a:off x="2936548" y="4668060"/>
-            <a:ext cx="1418896" cy="307777"/>
-          </a:xfrm>
-          <a:prstGeom prst="rect">
-            <a:avLst/>
-          </a:prstGeom>
-          <a:noFill/>
-        </p:spPr>
-        <p:txBody>
-          <a:bodyPr wrap="square" rtlCol="0">
-            <a:spAutoFit/>
-          </a:bodyPr>
-          <a:lstStyle/>
-          <a:p>
-            <a:r>
-              <a:rPr lang="en-US" sz="1400" dirty="0"/>
-              <a:t>Reached Goal</a:t>
-            </a:r>
-          </a:p>
-        </p:txBody>
-      </p:sp>
-      <p:sp>
-        <p:nvSpPr>
-          <p:cNvPr id="69" name="TextBox 68">
-            <a:extLst>
-              <a:ext uri="{FF2B5EF4-FFF2-40B4-BE49-F238E27FC236}">
-                <a16:creationId xmlns:a16="http://schemas.microsoft.com/office/drawing/2014/main" id="{DC8D18FD-AD85-FB40-97CB-27C448AE0D98}"/>
-              </a:ext>
-            </a:extLst>
-          </p:cNvPr>
-          <p:cNvSpPr txBox="1"/>
-          <p:nvPr/>
-        </p:nvSpPr>
-        <p:spPr>
-          <a:xfrm rot="1193341">
-            <a:off x="10111187" y="3076704"/>
-            <a:ext cx="1418896" cy="523220"/>
-          </a:xfrm>
-          <a:prstGeom prst="rect">
-            <a:avLst/>
-          </a:prstGeom>
-          <a:noFill/>
-        </p:spPr>
-        <p:txBody>
-          <a:bodyPr wrap="square" rtlCol="0">
-            <a:spAutoFit/>
-          </a:bodyPr>
-          <a:lstStyle/>
-          <a:p>
-            <a:r>
-              <a:rPr lang="en-US" sz="1400" dirty="0"/>
-              <a:t>Starts Loop again</a:t>
-            </a:r>
-          </a:p>
-        </p:txBody>
-      </p:sp>
-      <p:sp>
-        <p:nvSpPr>
-          <p:cNvPr id="71" name="TextBox 70">
-            <a:extLst>
-              <a:ext uri="{FF2B5EF4-FFF2-40B4-BE49-F238E27FC236}">
-                <a16:creationId xmlns:a16="http://schemas.microsoft.com/office/drawing/2014/main" id="{4C6BFF1D-FBCF-F142-B709-5436AB8843A2}"/>
-              </a:ext>
-            </a:extLst>
-          </p:cNvPr>
-          <p:cNvSpPr txBox="1"/>
-          <p:nvPr/>
-        </p:nvSpPr>
-        <p:spPr>
-          <a:xfrm rot="20193307">
-            <a:off x="892383" y="4195092"/>
-            <a:ext cx="1418896" cy="523220"/>
-          </a:xfrm>
-          <a:prstGeom prst="rect">
-            <a:avLst/>
-          </a:prstGeom>
-          <a:noFill/>
-        </p:spPr>
-        <p:txBody>
-          <a:bodyPr wrap="square" rtlCol="0">
-            <a:spAutoFit/>
-          </a:bodyPr>
-          <a:lstStyle/>
-          <a:p>
-            <a:r>
-              <a:rPr lang="en-US" sz="1400" dirty="0"/>
-              <a:t>Updates in location</a:t>
+              <a:t>Passes it the network class and the map</a:t>
             </a:r>
           </a:p>
         </p:txBody>
       </p:sp>
       <p:cxnSp>
         <p:nvCxnSpPr>
-          <p:cNvPr id="72" name="Straight Arrow Connector 71">
-            <a:extLst>
-              <a:ext uri="{FF2B5EF4-FFF2-40B4-BE49-F238E27FC236}">
-                <a16:creationId xmlns:a16="http://schemas.microsoft.com/office/drawing/2014/main" id="{A8184C80-A880-B44D-A72C-CA72EEE74227}"/>
+          <p:cNvPr id="79" name="Straight Arrow Connector 78">
+            <a:extLst>
+              <a:ext uri="{FF2B5EF4-FFF2-40B4-BE49-F238E27FC236}">
+                <a16:creationId xmlns:a16="http://schemas.microsoft.com/office/drawing/2014/main" id="{161C6275-2EC4-2C44-82B2-B4493DAE2AF4}"/>
               </a:ext>
             </a:extLst>
           </p:cNvPr>
           <p:cNvCxnSpPr>
             <a:cxnSpLocks/>
-            <a:stCxn id="56" idx="2"/>
-            <a:endCxn id="77" idx="0"/>
+            <a:stCxn id="16" idx="2"/>
+            <a:endCxn id="102" idx="0"/>
           </p:cNvCxnSpPr>
           <p:nvPr/>
         </p:nvCxnSpPr>
         <p:spPr>
           <a:xfrm>
-            <a:off x="2564523" y="4326668"/>
-            <a:ext cx="1309471" cy="829627"/>
-          </a:xfrm>
-          <a:prstGeom prst="straightConnector1">
-            <a:avLst/>
-          </a:prstGeom>
-          <a:ln>
-            <a:tailEnd type="triangle"/>
-          </a:ln>
-        </p:spPr>
-        <p:style>
-          <a:lnRef idx="1">
-            <a:schemeClr val="accent2"/>
-          </a:lnRef>
-          <a:fillRef idx="0">
-            <a:schemeClr val="accent2"/>
-          </a:fillRef>
-          <a:effectRef idx="0">
-            <a:schemeClr val="accent2"/>
-          </a:effectRef>
-          <a:fontRef idx="minor">
-            <a:schemeClr val="tx1"/>
-          </a:fontRef>
-        </p:style>
-      </p:cxnSp>
-      <p:cxnSp>
-        <p:nvCxnSpPr>
-          <p:cNvPr id="73" name="Straight Arrow Connector 72">
-            <a:extLst>
-              <a:ext uri="{FF2B5EF4-FFF2-40B4-BE49-F238E27FC236}">
-                <a16:creationId xmlns:a16="http://schemas.microsoft.com/office/drawing/2014/main" id="{7377E072-2888-C54C-AD0B-8A6077B7391E}"/>
-              </a:ext>
-            </a:extLst>
-          </p:cNvPr>
-          <p:cNvCxnSpPr>
-            <a:cxnSpLocks/>
-            <a:stCxn id="63" idx="2"/>
-            <a:endCxn id="62" idx="0"/>
-          </p:cNvCxnSpPr>
-          <p:nvPr/>
-        </p:nvCxnSpPr>
-        <p:spPr>
-          <a:xfrm>
-            <a:off x="1054928" y="5598030"/>
-            <a:ext cx="27132" cy="523180"/>
+            <a:off x="7866246" y="1065686"/>
+            <a:ext cx="1156688" cy="2049151"/>
           </a:xfrm>
           <a:prstGeom prst="straightConnector1">
             <a:avLst/>
@@ -4842,10 +4092,10 @@
       </p:cxnSp>
       <p:sp>
         <p:nvSpPr>
-          <p:cNvPr id="77" name="Rectangle 76">
-            <a:extLst>
-              <a:ext uri="{FF2B5EF4-FFF2-40B4-BE49-F238E27FC236}">
-                <a16:creationId xmlns:a16="http://schemas.microsoft.com/office/drawing/2014/main" id="{A62F0EF8-CA0C-F84E-B37E-A78959224765}"/>
+          <p:cNvPr id="102" name="Rectangle 101">
+            <a:extLst>
+              <a:ext uri="{FF2B5EF4-FFF2-40B4-BE49-F238E27FC236}">
+                <a16:creationId xmlns:a16="http://schemas.microsoft.com/office/drawing/2014/main" id="{B20FD1C5-0ACF-6E4A-9C05-06973D84D320}"/>
               </a:ext>
             </a:extLst>
           </p:cNvPr>
@@ -4854,8 +4104,8 @@
         </p:nvSpPr>
         <p:spPr>
           <a:xfrm>
-            <a:off x="3148780" y="5156295"/>
-            <a:ext cx="1450428" cy="683173"/>
+            <a:off x="8329251" y="3114837"/>
+            <a:ext cx="1387366" cy="735725"/>
           </a:xfrm>
           <a:prstGeom prst="rect">
             <a:avLst/>
@@ -4883,18 +4133,53 @@
           <a:p>
             <a:pPr algn="ctr"/>
             <a:r>
-              <a:rPr lang="en-US" dirty="0"/>
-              <a:t>Networking</a:t>
-            </a:r>
-          </a:p>
-        </p:txBody>
-      </p:sp>
-      <p:sp>
-        <p:nvSpPr>
-          <p:cNvPr id="81" name="Rectangle 80">
-            <a:extLst>
-              <a:ext uri="{FF2B5EF4-FFF2-40B4-BE49-F238E27FC236}">
-                <a16:creationId xmlns:a16="http://schemas.microsoft.com/office/drawing/2014/main" id="{46C46270-4806-A748-9AC3-CEBB5A0277B1}"/>
+              <a:rPr lang="en-US" b="1" dirty="0"/>
+              <a:t>Job Assigner</a:t>
+            </a:r>
+          </a:p>
+        </p:txBody>
+      </p:sp>
+      <p:sp>
+        <p:nvSpPr>
+          <p:cNvPr id="103" name="TextBox 102">
+            <a:extLst>
+              <a:ext uri="{FF2B5EF4-FFF2-40B4-BE49-F238E27FC236}">
+                <a16:creationId xmlns:a16="http://schemas.microsoft.com/office/drawing/2014/main" id="{12C15F19-BE1E-7844-8647-071C16993275}"/>
+              </a:ext>
+            </a:extLst>
+          </p:cNvPr>
+          <p:cNvSpPr txBox="1"/>
+          <p:nvPr/>
+        </p:nvSpPr>
+        <p:spPr>
+          <a:xfrm>
+            <a:off x="7659819" y="1789828"/>
+            <a:ext cx="1418896" cy="1384995"/>
+          </a:xfrm>
+          <a:prstGeom prst="rect">
+            <a:avLst/>
+          </a:prstGeom>
+          <a:noFill/>
+        </p:spPr>
+        <p:txBody>
+          <a:bodyPr wrap="square" rtlCol="0">
+            <a:spAutoFit/>
+          </a:bodyPr>
+          <a:lstStyle/>
+          <a:p>
+            <a:r>
+              <a:rPr lang="en-US" sz="1400" dirty="0"/>
+              <a:t>Asks for a route starting from a location/ asks for a route dependent on robot ID</a:t>
+            </a:r>
+          </a:p>
+        </p:txBody>
+      </p:sp>
+      <p:sp>
+        <p:nvSpPr>
+          <p:cNvPr id="110" name="Rectangle 109">
+            <a:extLst>
+              <a:ext uri="{FF2B5EF4-FFF2-40B4-BE49-F238E27FC236}">
+                <a16:creationId xmlns:a16="http://schemas.microsoft.com/office/drawing/2014/main" id="{50BF5613-D2D2-EF47-9944-2F250DFF6426}"/>
               </a:ext>
             </a:extLst>
           </p:cNvPr>
@@ -4903,8 +4188,8 @@
         </p:nvSpPr>
         <p:spPr>
           <a:xfrm>
-            <a:off x="10462441" y="5156294"/>
-            <a:ext cx="1450428" cy="683173"/>
+            <a:off x="5562733" y="3114836"/>
+            <a:ext cx="1387366" cy="735725"/>
           </a:xfrm>
           <a:prstGeom prst="rect">
             <a:avLst/>
@@ -4932,32 +4217,31 @@
           <a:p>
             <a:pPr algn="ctr"/>
             <a:r>
-              <a:rPr lang="en-US" dirty="0"/>
-              <a:t>Job Assigner</a:t>
+              <a:rPr lang="en-US" b="1" dirty="0"/>
+              <a:t>ROBOT</a:t>
             </a:r>
           </a:p>
         </p:txBody>
       </p:sp>
       <p:cxnSp>
         <p:nvCxnSpPr>
-          <p:cNvPr id="83" name="Straight Arrow Connector 82">
-            <a:extLst>
-              <a:ext uri="{FF2B5EF4-FFF2-40B4-BE49-F238E27FC236}">
-                <a16:creationId xmlns:a16="http://schemas.microsoft.com/office/drawing/2014/main" id="{79D2F4CD-D60F-AF4C-96FE-A269A4AB9A66}"/>
+          <p:cNvPr id="107" name="Straight Arrow Connector 106">
+            <a:extLst>
+              <a:ext uri="{FF2B5EF4-FFF2-40B4-BE49-F238E27FC236}">
+                <a16:creationId xmlns:a16="http://schemas.microsoft.com/office/drawing/2014/main" id="{ACCA1B62-3EC8-914B-94A0-FE7EE39116FE}"/>
               </a:ext>
             </a:extLst>
           </p:cNvPr>
           <p:cNvCxnSpPr>
-            <a:cxnSpLocks/>
-            <a:stCxn id="77" idx="3"/>
-            <a:endCxn id="81" idx="1"/>
+            <a:stCxn id="16" idx="2"/>
+            <a:endCxn id="110" idx="0"/>
           </p:cNvCxnSpPr>
           <p:nvPr/>
         </p:nvCxnSpPr>
         <p:spPr>
-          <a:xfrm flipV="1">
-            <a:off x="4599208" y="5497881"/>
-            <a:ext cx="5863233" cy="1"/>
+          <a:xfrm flipH="1">
+            <a:off x="6256416" y="1065686"/>
+            <a:ext cx="1609830" cy="2049150"/>
           </a:xfrm>
           <a:prstGeom prst="straightConnector1">
             <a:avLst/>
@@ -4981,258 +4265,12 @@
           </a:fontRef>
         </p:style>
       </p:cxnSp>
-      <p:cxnSp>
-        <p:nvCxnSpPr>
-          <p:cNvPr id="88" name="Straight Arrow Connector 87">
-            <a:extLst>
-              <a:ext uri="{FF2B5EF4-FFF2-40B4-BE49-F238E27FC236}">
-                <a16:creationId xmlns:a16="http://schemas.microsoft.com/office/drawing/2014/main" id="{EB284C55-ED1F-044B-A636-AD54DDDE2860}"/>
-              </a:ext>
-            </a:extLst>
-          </p:cNvPr>
-          <p:cNvCxnSpPr>
-            <a:cxnSpLocks/>
-          </p:cNvCxnSpPr>
-          <p:nvPr/>
-        </p:nvCxnSpPr>
-        <p:spPr>
-          <a:xfrm flipH="1" flipV="1">
-            <a:off x="8329251" y="2517227"/>
-            <a:ext cx="2873548" cy="965658"/>
-          </a:xfrm>
-          <a:prstGeom prst="straightConnector1">
-            <a:avLst/>
-          </a:prstGeom>
-          <a:ln>
-            <a:tailEnd type="triangle"/>
-          </a:ln>
-        </p:spPr>
-        <p:style>
-          <a:lnRef idx="1">
-            <a:schemeClr val="accent1"/>
-          </a:lnRef>
-          <a:fillRef idx="0">
-            <a:schemeClr val="accent1"/>
-          </a:fillRef>
-          <a:effectRef idx="0">
-            <a:schemeClr val="accent1"/>
-          </a:effectRef>
-          <a:fontRef idx="minor">
-            <a:schemeClr val="tx1"/>
-          </a:fontRef>
-        </p:style>
-      </p:cxnSp>
-      <p:cxnSp>
-        <p:nvCxnSpPr>
-          <p:cNvPr id="93" name="Straight Connector 92">
-            <a:extLst>
-              <a:ext uri="{FF2B5EF4-FFF2-40B4-BE49-F238E27FC236}">
-                <a16:creationId xmlns:a16="http://schemas.microsoft.com/office/drawing/2014/main" id="{DB4E84EC-B8B4-AB4A-8361-1C174B8EBA8E}"/>
-              </a:ext>
-            </a:extLst>
-          </p:cNvPr>
-          <p:cNvCxnSpPr>
-            <a:cxnSpLocks/>
-            <a:endCxn id="81" idx="0"/>
-          </p:cNvCxnSpPr>
-          <p:nvPr/>
-        </p:nvCxnSpPr>
-        <p:spPr>
-          <a:xfrm>
-            <a:off x="11187655" y="3482885"/>
-            <a:ext cx="0" cy="1673409"/>
-          </a:xfrm>
-          <a:prstGeom prst="line">
-            <a:avLst/>
-          </a:prstGeom>
-        </p:spPr>
-        <p:style>
-          <a:lnRef idx="1">
-            <a:schemeClr val="accent1"/>
-          </a:lnRef>
-          <a:fillRef idx="0">
-            <a:schemeClr val="accent1"/>
-          </a:fillRef>
-          <a:effectRef idx="0">
-            <a:schemeClr val="accent1"/>
-          </a:effectRef>
-          <a:fontRef idx="minor">
-            <a:schemeClr val="tx1"/>
-          </a:fontRef>
-        </p:style>
-      </p:cxnSp>
-      <p:cxnSp>
-        <p:nvCxnSpPr>
-          <p:cNvPr id="97" name="Straight Arrow Connector 96">
-            <a:extLst>
-              <a:ext uri="{FF2B5EF4-FFF2-40B4-BE49-F238E27FC236}">
-                <a16:creationId xmlns:a16="http://schemas.microsoft.com/office/drawing/2014/main" id="{BCF47BE3-4D3C-BB44-8DBB-F54FB0B48184}"/>
-              </a:ext>
-            </a:extLst>
-          </p:cNvPr>
-          <p:cNvCxnSpPr>
-            <a:cxnSpLocks/>
-          </p:cNvCxnSpPr>
-          <p:nvPr/>
-        </p:nvCxnSpPr>
-        <p:spPr>
-          <a:xfrm flipV="1">
-            <a:off x="7056176" y="6163748"/>
-            <a:ext cx="827589" cy="1"/>
-          </a:xfrm>
-          <a:prstGeom prst="straightConnector1">
-            <a:avLst/>
-          </a:prstGeom>
-          <a:ln>
-            <a:tailEnd type="triangle"/>
-          </a:ln>
-        </p:spPr>
-        <p:style>
-          <a:lnRef idx="1">
-            <a:schemeClr val="accent1"/>
-          </a:lnRef>
-          <a:fillRef idx="0">
-            <a:schemeClr val="accent1"/>
-          </a:fillRef>
-          <a:effectRef idx="0">
-            <a:schemeClr val="accent1"/>
-          </a:effectRef>
-          <a:fontRef idx="minor">
-            <a:schemeClr val="tx1"/>
-          </a:fontRef>
-        </p:style>
-      </p:cxnSp>
-      <p:cxnSp>
-        <p:nvCxnSpPr>
-          <p:cNvPr id="99" name="Straight Arrow Connector 98">
-            <a:extLst>
-              <a:ext uri="{FF2B5EF4-FFF2-40B4-BE49-F238E27FC236}">
-                <a16:creationId xmlns:a16="http://schemas.microsoft.com/office/drawing/2014/main" id="{3CBD9781-3479-3342-82F8-A15DFDB7642D}"/>
-              </a:ext>
-            </a:extLst>
-          </p:cNvPr>
-          <p:cNvCxnSpPr>
-            <a:cxnSpLocks/>
-          </p:cNvCxnSpPr>
-          <p:nvPr/>
-        </p:nvCxnSpPr>
-        <p:spPr>
-          <a:xfrm>
-            <a:off x="7056175" y="6294327"/>
-            <a:ext cx="827589" cy="0"/>
-          </a:xfrm>
-          <a:prstGeom prst="straightConnector1">
-            <a:avLst/>
-          </a:prstGeom>
-          <a:ln>
-            <a:headEnd type="triangle"/>
-            <a:tailEnd type="triangle"/>
-          </a:ln>
-        </p:spPr>
-        <p:style>
-          <a:lnRef idx="1">
-            <a:schemeClr val="accent2"/>
-          </a:lnRef>
-          <a:fillRef idx="0">
-            <a:schemeClr val="accent2"/>
-          </a:fillRef>
-          <a:effectRef idx="0">
-            <a:schemeClr val="accent2"/>
-          </a:effectRef>
-          <a:fontRef idx="minor">
-            <a:schemeClr val="tx1"/>
-          </a:fontRef>
-        </p:style>
-      </p:cxnSp>
-      <p:cxnSp>
-        <p:nvCxnSpPr>
-          <p:cNvPr id="105" name="Straight Arrow Connector 104">
-            <a:extLst>
-              <a:ext uri="{FF2B5EF4-FFF2-40B4-BE49-F238E27FC236}">
-                <a16:creationId xmlns:a16="http://schemas.microsoft.com/office/drawing/2014/main" id="{92DDC026-D517-394B-9FEE-71BC2488B34C}"/>
-              </a:ext>
-            </a:extLst>
-          </p:cNvPr>
-          <p:cNvCxnSpPr>
-            <a:cxnSpLocks/>
-          </p:cNvCxnSpPr>
-          <p:nvPr/>
-        </p:nvCxnSpPr>
-        <p:spPr>
-          <a:xfrm flipH="1">
-            <a:off x="7049262" y="6462796"/>
-            <a:ext cx="834502" cy="0"/>
-          </a:xfrm>
-          <a:prstGeom prst="straightConnector1">
-            <a:avLst/>
-          </a:prstGeom>
-          <a:ln>
-            <a:headEnd type="triangle"/>
-            <a:tailEnd type="triangle"/>
-          </a:ln>
-        </p:spPr>
-        <p:style>
-          <a:lnRef idx="1">
-            <a:schemeClr val="accent3"/>
-          </a:lnRef>
-          <a:fillRef idx="0">
-            <a:schemeClr val="accent3"/>
-          </a:fillRef>
-          <a:effectRef idx="0">
-            <a:schemeClr val="accent3"/>
-          </a:effectRef>
-          <a:fontRef idx="minor">
-            <a:schemeClr val="tx1"/>
-          </a:fontRef>
-        </p:style>
-      </p:cxnSp>
-      <p:cxnSp>
-        <p:nvCxnSpPr>
-          <p:cNvPr id="108" name="Straight Arrow Connector 107">
-            <a:extLst>
-              <a:ext uri="{FF2B5EF4-FFF2-40B4-BE49-F238E27FC236}">
-                <a16:creationId xmlns:a16="http://schemas.microsoft.com/office/drawing/2014/main" id="{723EC177-25A9-6E41-A81C-03A8323B1D8C}"/>
-              </a:ext>
-            </a:extLst>
-          </p:cNvPr>
-          <p:cNvCxnSpPr>
-            <a:cxnSpLocks/>
-          </p:cNvCxnSpPr>
-          <p:nvPr/>
-        </p:nvCxnSpPr>
-        <p:spPr>
-          <a:xfrm flipH="1">
-            <a:off x="7049262" y="6600429"/>
-            <a:ext cx="816984" cy="0"/>
-          </a:xfrm>
-          <a:prstGeom prst="straightConnector1">
-            <a:avLst/>
-          </a:prstGeom>
-          <a:ln>
-            <a:tailEnd type="triangle"/>
-          </a:ln>
-        </p:spPr>
-        <p:style>
-          <a:lnRef idx="1">
-            <a:schemeClr val="accent6"/>
-          </a:lnRef>
-          <a:fillRef idx="0">
-            <a:schemeClr val="accent6"/>
-          </a:fillRef>
-          <a:effectRef idx="0">
-            <a:schemeClr val="accent6"/>
-          </a:effectRef>
-          <a:fontRef idx="minor">
-            <a:schemeClr val="tx1"/>
-          </a:fontRef>
-        </p:style>
-      </p:cxnSp>
-      <p:sp>
-        <p:nvSpPr>
-          <p:cNvPr id="109" name="TextBox 108">
-            <a:extLst>
-              <a:ext uri="{FF2B5EF4-FFF2-40B4-BE49-F238E27FC236}">
-                <a16:creationId xmlns:a16="http://schemas.microsoft.com/office/drawing/2014/main" id="{414C2711-D23F-A64D-8EC0-E6DCEA8C70D7}"/>
+      <p:sp>
+        <p:nvSpPr>
+          <p:cNvPr id="111" name="TextBox 110">
+            <a:extLst>
+              <a:ext uri="{FF2B5EF4-FFF2-40B4-BE49-F238E27FC236}">
+                <a16:creationId xmlns:a16="http://schemas.microsoft.com/office/drawing/2014/main" id="{8E74C9E8-4E04-E043-BD82-46B3FC441F9D}"/>
               </a:ext>
             </a:extLst>
           </p:cNvPr>
@@ -5240,9 +4278,9 @@
           <p:nvPr/>
         </p:nvSpPr>
         <p:spPr>
-          <a:xfrm>
-            <a:off x="7813433" y="5981867"/>
-            <a:ext cx="1031636" cy="1046440"/>
+          <a:xfrm rot="18544253">
+            <a:off x="6060250" y="1615771"/>
+            <a:ext cx="1518782" cy="923330"/>
           </a:xfrm>
           <a:prstGeom prst="rect">
             <a:avLst/>
@@ -5256,50 +4294,9 @@
           <a:lstStyle/>
           <a:p>
             <a:r>
-              <a:rPr lang="en-US" sz="1100" dirty="0"/>
-              <a:t>1</a:t>
-            </a:r>
-            <a:r>
-              <a:rPr lang="en-US" sz="1100" baseline="30000" dirty="0"/>
-              <a:t>st</a:t>
-            </a:r>
-            <a:endParaRPr lang="en-US" sz="1100" dirty="0"/>
-          </a:p>
-          <a:p>
-            <a:r>
-              <a:rPr lang="en-US" sz="1100" dirty="0"/>
-              <a:t>2</a:t>
-            </a:r>
-            <a:r>
-              <a:rPr lang="en-US" sz="1100" baseline="30000" dirty="0"/>
-              <a:t>nd</a:t>
-            </a:r>
-            <a:endParaRPr lang="en-US" sz="1100" dirty="0"/>
-          </a:p>
-          <a:p>
-            <a:r>
-              <a:rPr lang="en-US" sz="1100" dirty="0"/>
-              <a:t>3</a:t>
-            </a:r>
-            <a:r>
-              <a:rPr lang="en-US" sz="1100" baseline="30000" dirty="0"/>
-              <a:t>rd</a:t>
-            </a:r>
-            <a:endParaRPr lang="en-US" sz="1100" dirty="0"/>
-          </a:p>
-          <a:p>
-            <a:r>
-              <a:rPr lang="en-US" sz="1100" dirty="0"/>
-              <a:t>4</a:t>
-            </a:r>
-            <a:r>
-              <a:rPr lang="en-US" sz="1100" baseline="30000" dirty="0"/>
-              <a:t>th</a:t>
-            </a:r>
-            <a:endParaRPr lang="en-US" sz="1100" dirty="0"/>
-          </a:p>
-          <a:p>
-            <a:endParaRPr lang="en-US" dirty="0"/>
+              <a:rPr lang="en-US" dirty="0"/>
+              <a:t>Passes a bunch of locations</a:t>
+            </a:r>
           </a:p>
         </p:txBody>
       </p:sp>

</xml_diff>

<commit_message>
Revert "Merge branch 'testing' into RoutePlanner"
This reverts commit 60d03ea49ab670087aefb52a920637f67dcad20a, reversing
changes made to 10916feba104872ab4e581f69a1351ab520d264e.
</commit_message>
<xml_diff>
--- a/Notes/Structure Of Classes/Integration of Classes.pptx
+++ b/Notes/Structure Of Classes/Integration of Classes.pptx
@@ -104,11 +104,6 @@
       </a:defRPr>
     </a:lvl9pPr>
   </p:defaultTextStyle>
-  <p:extLst>
-    <p:ext uri="{EFAFB233-063F-42B5-8137-9DF3F51BA10A}">
-      <p15:sldGuideLst xmlns:p15="http://schemas.microsoft.com/office/powerpoint/2012/main"/>
-    </p:ext>
-  </p:extLst>
 </p:presentation>
 </file>
 
@@ -259,7 +254,7 @@
           <a:p>
             <a:fld id="{EFAC2891-D99D-F64B-A3B9-33B13418B0EE}" type="datetimeFigureOut">
               <a:rPr lang="en-US" smtClean="0"/>
-              <a:t>3/18/18</a:t>
+              <a:t>3/12/18</a:t>
             </a:fld>
             <a:endParaRPr lang="en-US"/>
           </a:p>
@@ -457,7 +452,7 @@
           <a:p>
             <a:fld id="{EFAC2891-D99D-F64B-A3B9-33B13418B0EE}" type="datetimeFigureOut">
               <a:rPr lang="en-US" smtClean="0"/>
-              <a:t>3/18/18</a:t>
+              <a:t>3/12/18</a:t>
             </a:fld>
             <a:endParaRPr lang="en-US"/>
           </a:p>
@@ -665,7 +660,7 @@
           <a:p>
             <a:fld id="{EFAC2891-D99D-F64B-A3B9-33B13418B0EE}" type="datetimeFigureOut">
               <a:rPr lang="en-US" smtClean="0"/>
-              <a:t>3/18/18</a:t>
+              <a:t>3/12/18</a:t>
             </a:fld>
             <a:endParaRPr lang="en-US"/>
           </a:p>
@@ -863,7 +858,7 @@
           <a:p>
             <a:fld id="{EFAC2891-D99D-F64B-A3B9-33B13418B0EE}" type="datetimeFigureOut">
               <a:rPr lang="en-US" smtClean="0"/>
-              <a:t>3/18/18</a:t>
+              <a:t>3/12/18</a:t>
             </a:fld>
             <a:endParaRPr lang="en-US"/>
           </a:p>
@@ -1138,7 +1133,7 @@
           <a:p>
             <a:fld id="{EFAC2891-D99D-F64B-A3B9-33B13418B0EE}" type="datetimeFigureOut">
               <a:rPr lang="en-US" smtClean="0"/>
-              <a:t>3/18/18</a:t>
+              <a:t>3/12/18</a:t>
             </a:fld>
             <a:endParaRPr lang="en-US"/>
           </a:p>
@@ -1403,7 +1398,7 @@
           <a:p>
             <a:fld id="{EFAC2891-D99D-F64B-A3B9-33B13418B0EE}" type="datetimeFigureOut">
               <a:rPr lang="en-US" smtClean="0"/>
-              <a:t>3/18/18</a:t>
+              <a:t>3/12/18</a:t>
             </a:fld>
             <a:endParaRPr lang="en-US"/>
           </a:p>
@@ -1815,7 +1810,7 @@
           <a:p>
             <a:fld id="{EFAC2891-D99D-F64B-A3B9-33B13418B0EE}" type="datetimeFigureOut">
               <a:rPr lang="en-US" smtClean="0"/>
-              <a:t>3/18/18</a:t>
+              <a:t>3/12/18</a:t>
             </a:fld>
             <a:endParaRPr lang="en-US"/>
           </a:p>
@@ -1956,7 +1951,7 @@
           <a:p>
             <a:fld id="{EFAC2891-D99D-F64B-A3B9-33B13418B0EE}" type="datetimeFigureOut">
               <a:rPr lang="en-US" smtClean="0"/>
-              <a:t>3/18/18</a:t>
+              <a:t>3/12/18</a:t>
             </a:fld>
             <a:endParaRPr lang="en-US"/>
           </a:p>
@@ -2069,7 +2064,7 @@
           <a:p>
             <a:fld id="{EFAC2891-D99D-F64B-A3B9-33B13418B0EE}" type="datetimeFigureOut">
               <a:rPr lang="en-US" smtClean="0"/>
-              <a:t>3/18/18</a:t>
+              <a:t>3/12/18</a:t>
             </a:fld>
             <a:endParaRPr lang="en-US"/>
           </a:p>
@@ -2380,7 +2375,7 @@
           <a:p>
             <a:fld id="{EFAC2891-D99D-F64B-A3B9-33B13418B0EE}" type="datetimeFigureOut">
               <a:rPr lang="en-US" smtClean="0"/>
-              <a:t>3/18/18</a:t>
+              <a:t>3/12/18</a:t>
             </a:fld>
             <a:endParaRPr lang="en-US"/>
           </a:p>
@@ -2668,7 +2663,7 @@
           <a:p>
             <a:fld id="{EFAC2891-D99D-F64B-A3B9-33B13418B0EE}" type="datetimeFigureOut">
               <a:rPr lang="en-US" smtClean="0"/>
-              <a:t>3/18/18</a:t>
+              <a:t>3/12/18</a:t>
             </a:fld>
             <a:endParaRPr lang="en-US"/>
           </a:p>
@@ -2909,7 +2904,7 @@
           <a:p>
             <a:fld id="{EFAC2891-D99D-F64B-A3B9-33B13418B0EE}" type="datetimeFigureOut">
               <a:rPr lang="en-US" smtClean="0"/>
-              <a:t>3/18/18</a:t>
+              <a:t>3/12/18</a:t>
             </a:fld>
             <a:endParaRPr lang="en-US"/>
           </a:p>
@@ -3389,7 +3384,7 @@
         </p:nvSpPr>
         <p:spPr>
           <a:xfrm>
-            <a:off x="3056712" y="157250"/>
+            <a:off x="3463157" y="756745"/>
             <a:ext cx="1387366" cy="735725"/>
           </a:xfrm>
           <a:prstGeom prst="rect">
@@ -3531,9 +3526,9 @@
           <p:nvPr/>
         </p:nvCxnSpPr>
         <p:spPr>
-          <a:xfrm flipV="1">
-            <a:off x="2175641" y="525113"/>
-            <a:ext cx="881071" cy="599495"/>
+          <a:xfrm>
+            <a:off x="2175641" y="1124608"/>
+            <a:ext cx="1287516" cy="0"/>
           </a:xfrm>
           <a:prstGeom prst="straightConnector1">
             <a:avLst/>
@@ -3594,10 +3589,10 @@
       </p:sp>
       <p:sp>
         <p:nvSpPr>
-          <p:cNvPr id="16" name="Rectangle 15">
-            <a:extLst>
-              <a:ext uri="{FF2B5EF4-FFF2-40B4-BE49-F238E27FC236}">
-                <a16:creationId xmlns:a16="http://schemas.microsoft.com/office/drawing/2014/main" id="{D87BD2B3-5DF7-3443-B511-F67C2ECBE9C5}"/>
+          <p:cNvPr id="15" name="Rectangle 14">
+            <a:extLst>
+              <a:ext uri="{FF2B5EF4-FFF2-40B4-BE49-F238E27FC236}">
+                <a16:creationId xmlns:a16="http://schemas.microsoft.com/office/drawing/2014/main" id="{7B485B1D-C2C1-1D41-A762-25276D74D91D}"/>
               </a:ext>
             </a:extLst>
           </p:cNvPr>
@@ -3606,7 +3601,7 @@
         </p:nvSpPr>
         <p:spPr>
           <a:xfrm>
-            <a:off x="7172563" y="329961"/>
+            <a:off x="6942082" y="1781501"/>
             <a:ext cx="1387366" cy="735725"/>
           </a:xfrm>
           <a:prstGeom prst="rect">
@@ -3636,6 +3631,55 @@
             <a:pPr algn="ctr"/>
             <a:r>
               <a:rPr lang="en-US" b="1" dirty="0"/>
+              <a:t>Job Assigner</a:t>
+            </a:r>
+          </a:p>
+        </p:txBody>
+      </p:sp>
+      <p:sp>
+        <p:nvSpPr>
+          <p:cNvPr id="16" name="Rectangle 15">
+            <a:extLst>
+              <a:ext uri="{FF2B5EF4-FFF2-40B4-BE49-F238E27FC236}">
+                <a16:creationId xmlns:a16="http://schemas.microsoft.com/office/drawing/2014/main" id="{D87BD2B3-5DF7-3443-B511-F67C2ECBE9C5}"/>
+              </a:ext>
+            </a:extLst>
+          </p:cNvPr>
+          <p:cNvSpPr/>
+          <p:nvPr/>
+        </p:nvSpPr>
+        <p:spPr>
+          <a:xfrm>
+            <a:off x="7883765" y="136560"/>
+            <a:ext cx="1387366" cy="735725"/>
+          </a:xfrm>
+          <a:prstGeom prst="rect">
+            <a:avLst/>
+          </a:prstGeom>
+        </p:spPr>
+        <p:style>
+          <a:lnRef idx="2">
+            <a:schemeClr val="accent1">
+              <a:shade val="50000"/>
+            </a:schemeClr>
+          </a:lnRef>
+          <a:fillRef idx="1">
+            <a:schemeClr val="accent1"/>
+          </a:fillRef>
+          <a:effectRef idx="0">
+            <a:schemeClr val="accent1"/>
+          </a:effectRef>
+          <a:fontRef idx="minor">
+            <a:schemeClr val="lt1"/>
+          </a:fontRef>
+        </p:style>
+        <p:txBody>
+          <a:bodyPr rtlCol="0" anchor="ctr"/>
+          <a:lstStyle/>
+          <a:p>
+            <a:pPr algn="ctr"/>
+            <a:r>
+              <a:rPr lang="en-US" b="1" dirty="0"/>
               <a:t>Networking</a:t>
             </a:r>
           </a:p>
@@ -3658,9 +3702,9 @@
           <p:nvPr/>
         </p:nvCxnSpPr>
         <p:spPr>
-          <a:xfrm>
-            <a:off x="4444078" y="525113"/>
-            <a:ext cx="2728485" cy="172711"/>
+          <a:xfrm flipV="1">
+            <a:off x="4850523" y="504423"/>
+            <a:ext cx="3033242" cy="620185"/>
           </a:xfrm>
           <a:prstGeom prst="straightConnector1">
             <a:avLst/>
@@ -3697,8 +3741,8 @@
           <p:nvPr/>
         </p:nvSpPr>
         <p:spPr>
-          <a:xfrm rot="261029">
-            <a:off x="4575231" y="109706"/>
+          <a:xfrm rot="20923067">
+            <a:off x="5139551" y="117085"/>
             <a:ext cx="2466178" cy="954107"/>
           </a:xfrm>
           <a:prstGeom prst="rect">
@@ -3719,12 +3763,55 @@
           </a:p>
         </p:txBody>
       </p:sp>
-      <p:sp>
-        <p:nvSpPr>
-          <p:cNvPr id="109" name="TextBox 108">
-            <a:extLst>
-              <a:ext uri="{FF2B5EF4-FFF2-40B4-BE49-F238E27FC236}">
-                <a16:creationId xmlns:a16="http://schemas.microsoft.com/office/drawing/2014/main" id="{414C2711-D23F-A64D-8EC0-E6DCEA8C70D7}"/>
+      <p:cxnSp>
+        <p:nvCxnSpPr>
+          <p:cNvPr id="22" name="Straight Arrow Connector 21">
+            <a:extLst>
+              <a:ext uri="{FF2B5EF4-FFF2-40B4-BE49-F238E27FC236}">
+                <a16:creationId xmlns:a16="http://schemas.microsoft.com/office/drawing/2014/main" id="{FC31925A-3498-DD45-9CB8-94DB653416C9}"/>
+              </a:ext>
+            </a:extLst>
+          </p:cNvPr>
+          <p:cNvCxnSpPr>
+            <a:cxnSpLocks/>
+            <a:stCxn id="6" idx="3"/>
+            <a:endCxn id="15" idx="1"/>
+          </p:cNvCxnSpPr>
+          <p:nvPr/>
+        </p:nvCxnSpPr>
+        <p:spPr>
+          <a:xfrm>
+            <a:off x="4850523" y="1124608"/>
+            <a:ext cx="2091559" cy="1024756"/>
+          </a:xfrm>
+          <a:prstGeom prst="straightConnector1">
+            <a:avLst/>
+          </a:prstGeom>
+          <a:ln>
+            <a:tailEnd type="triangle"/>
+          </a:ln>
+        </p:spPr>
+        <p:style>
+          <a:lnRef idx="1">
+            <a:schemeClr val="accent2"/>
+          </a:lnRef>
+          <a:fillRef idx="0">
+            <a:schemeClr val="accent2"/>
+          </a:fillRef>
+          <a:effectRef idx="0">
+            <a:schemeClr val="accent2"/>
+          </a:effectRef>
+          <a:fontRef idx="minor">
+            <a:schemeClr val="tx1"/>
+          </a:fontRef>
+        </p:style>
+      </p:cxnSp>
+      <p:sp>
+        <p:nvSpPr>
+          <p:cNvPr id="24" name="TextBox 23">
+            <a:extLst>
+              <a:ext uri="{FF2B5EF4-FFF2-40B4-BE49-F238E27FC236}">
+                <a16:creationId xmlns:a16="http://schemas.microsoft.com/office/drawing/2014/main" id="{9237443F-23DB-D345-AC0C-560DAD7E4662}"/>
               </a:ext>
             </a:extLst>
           </p:cNvPr>
@@ -3732,9 +3819,9 @@
           <p:nvPr/>
         </p:nvSpPr>
         <p:spPr>
-          <a:xfrm>
-            <a:off x="7813433" y="5981867"/>
-            <a:ext cx="1031636" cy="1046440"/>
+          <a:xfrm rot="1570501">
+            <a:off x="5186853" y="1665781"/>
+            <a:ext cx="1418896" cy="523220"/>
           </a:xfrm>
           <a:prstGeom prst="rect">
             <a:avLst/>
@@ -3748,59 +3835,58 @@
           <a:lstStyle/>
           <a:p>
             <a:r>
-              <a:rPr lang="en-US" sz="1100" dirty="0"/>
-              <a:t>1</a:t>
-            </a:r>
-            <a:r>
-              <a:rPr lang="en-US" sz="1100" baseline="30000" dirty="0"/>
-              <a:t>st</a:t>
-            </a:r>
-            <a:endParaRPr lang="en-US" sz="1100" dirty="0"/>
-          </a:p>
-          <a:p>
-            <a:r>
-              <a:rPr lang="en-US" sz="1100" dirty="0"/>
-              <a:t>2</a:t>
-            </a:r>
-            <a:r>
-              <a:rPr lang="en-US" sz="1100" baseline="30000" dirty="0"/>
-              <a:t>nd</a:t>
-            </a:r>
-            <a:endParaRPr lang="en-US" sz="1100" dirty="0"/>
-          </a:p>
-          <a:p>
-            <a:r>
-              <a:rPr lang="en-US" sz="1100" dirty="0"/>
-              <a:t>3</a:t>
-            </a:r>
-            <a:r>
-              <a:rPr lang="en-US" sz="1100" baseline="30000" dirty="0"/>
-              <a:t>rd</a:t>
-            </a:r>
-            <a:endParaRPr lang="en-US" sz="1100" dirty="0"/>
-          </a:p>
-          <a:p>
-            <a:r>
-              <a:rPr lang="en-US" sz="1100" dirty="0"/>
-              <a:t>4</a:t>
-            </a:r>
-            <a:r>
-              <a:rPr lang="en-US" sz="1100" baseline="30000" dirty="0"/>
-              <a:t>th</a:t>
-            </a:r>
-            <a:endParaRPr lang="en-US" sz="1100" dirty="0"/>
-          </a:p>
-          <a:p>
-            <a:endParaRPr lang="en-US" dirty="0"/>
-          </a:p>
-        </p:txBody>
-      </p:sp>
-      <p:sp>
-        <p:nvSpPr>
-          <p:cNvPr id="82" name="Rectangle 81">
-            <a:extLst>
-              <a:ext uri="{FF2B5EF4-FFF2-40B4-BE49-F238E27FC236}">
-                <a16:creationId xmlns:a16="http://schemas.microsoft.com/office/drawing/2014/main" id="{9B69FDB1-4702-AD45-829F-60279D073BC9}"/>
+              <a:rPr lang="en-US" sz="1400" dirty="0"/>
+              <a:t>Passes it the network class</a:t>
+            </a:r>
+          </a:p>
+        </p:txBody>
+      </p:sp>
+      <p:cxnSp>
+        <p:nvCxnSpPr>
+          <p:cNvPr id="26" name="Straight Connector 25">
+            <a:extLst>
+              <a:ext uri="{FF2B5EF4-FFF2-40B4-BE49-F238E27FC236}">
+                <a16:creationId xmlns:a16="http://schemas.microsoft.com/office/drawing/2014/main" id="{D2078256-0917-6E4A-8447-1DD17B533820}"/>
+              </a:ext>
+            </a:extLst>
+          </p:cNvPr>
+          <p:cNvCxnSpPr>
+            <a:cxnSpLocks/>
+            <a:stCxn id="15" idx="3"/>
+            <a:endCxn id="28" idx="1"/>
+          </p:cNvCxnSpPr>
+          <p:nvPr/>
+        </p:nvCxnSpPr>
+        <p:spPr>
+          <a:xfrm>
+            <a:off x="8329448" y="2149364"/>
+            <a:ext cx="1975945" cy="0"/>
+          </a:xfrm>
+          <a:prstGeom prst="line">
+            <a:avLst/>
+          </a:prstGeom>
+        </p:spPr>
+        <p:style>
+          <a:lnRef idx="1">
+            <a:schemeClr val="accent1"/>
+          </a:lnRef>
+          <a:fillRef idx="0">
+            <a:schemeClr val="accent1"/>
+          </a:fillRef>
+          <a:effectRef idx="0">
+            <a:schemeClr val="accent1"/>
+          </a:effectRef>
+          <a:fontRef idx="minor">
+            <a:schemeClr val="tx1"/>
+          </a:fontRef>
+        </p:style>
+      </p:cxnSp>
+      <p:sp>
+        <p:nvSpPr>
+          <p:cNvPr id="28" name="Rectangle 27">
+            <a:extLst>
+              <a:ext uri="{FF2B5EF4-FFF2-40B4-BE49-F238E27FC236}">
+                <a16:creationId xmlns:a16="http://schemas.microsoft.com/office/drawing/2014/main" id="{A5B45295-5045-D34D-8DEB-EECA6FEEF569}"/>
               </a:ext>
             </a:extLst>
           </p:cNvPr>
@@ -3809,8 +3895,8 @@
         </p:nvSpPr>
         <p:spPr>
           <a:xfrm>
-            <a:off x="10516170" y="356236"/>
-            <a:ext cx="1450428" cy="683173"/>
+            <a:off x="10305393" y="1781501"/>
+            <a:ext cx="1439917" cy="735725"/>
           </a:xfrm>
           <a:prstGeom prst="rect">
             <a:avLst/>
@@ -3839,59 +3925,17 @@
             <a:pPr algn="ctr"/>
             <a:r>
               <a:rPr lang="en-US" dirty="0"/>
-              <a:t>Map</a:t>
-            </a:r>
-          </a:p>
-        </p:txBody>
-      </p:sp>
-      <p:cxnSp>
-        <p:nvCxnSpPr>
-          <p:cNvPr id="68" name="Straight Arrow Connector 67">
-            <a:extLst>
-              <a:ext uri="{FF2B5EF4-FFF2-40B4-BE49-F238E27FC236}">
-                <a16:creationId xmlns:a16="http://schemas.microsoft.com/office/drawing/2014/main" id="{8B47C541-274C-C543-9742-0CA56CBF85F9}"/>
-              </a:ext>
-            </a:extLst>
-          </p:cNvPr>
-          <p:cNvCxnSpPr>
-            <a:stCxn id="16" idx="3"/>
-            <a:endCxn id="82" idx="1"/>
-          </p:cNvCxnSpPr>
-          <p:nvPr/>
-        </p:nvCxnSpPr>
-        <p:spPr>
-          <a:xfrm flipV="1">
-            <a:off x="8559929" y="697823"/>
-            <a:ext cx="1956241" cy="1"/>
-          </a:xfrm>
-          <a:prstGeom prst="straightConnector1">
-            <a:avLst/>
-          </a:prstGeom>
-          <a:ln>
-            <a:tailEnd type="triangle"/>
-          </a:ln>
-        </p:spPr>
-        <p:style>
-          <a:lnRef idx="1">
-            <a:schemeClr val="accent1"/>
-          </a:lnRef>
-          <a:fillRef idx="0">
-            <a:schemeClr val="accent1"/>
-          </a:fillRef>
-          <a:effectRef idx="0">
-            <a:schemeClr val="accent1"/>
-          </a:effectRef>
-          <a:fontRef idx="minor">
-            <a:schemeClr val="tx1"/>
-          </a:fontRef>
-        </p:style>
-      </p:cxnSp>
-      <p:sp>
-        <p:nvSpPr>
-          <p:cNvPr id="87" name="TextBox 86">
-            <a:extLst>
-              <a:ext uri="{FF2B5EF4-FFF2-40B4-BE49-F238E27FC236}">
-                <a16:creationId xmlns:a16="http://schemas.microsoft.com/office/drawing/2014/main" id="{7D01D73F-F8B9-4940-B090-F2778C42483E}"/>
+              <a:t>Networking</a:t>
+            </a:r>
+          </a:p>
+        </p:txBody>
+      </p:sp>
+      <p:sp>
+        <p:nvSpPr>
+          <p:cNvPr id="29" name="TextBox 28">
+            <a:extLst>
+              <a:ext uri="{FF2B5EF4-FFF2-40B4-BE49-F238E27FC236}">
+                <a16:creationId xmlns:a16="http://schemas.microsoft.com/office/drawing/2014/main" id="{AE33EA88-3E21-884E-8153-79DA2D7BE6D5}"/>
               </a:ext>
             </a:extLst>
           </p:cNvPr>
@@ -3900,8 +3944,8 @@
         </p:nvSpPr>
         <p:spPr>
           <a:xfrm>
-            <a:off x="8849375" y="190892"/>
-            <a:ext cx="1418896" cy="738664"/>
+            <a:off x="8374731" y="1447772"/>
+            <a:ext cx="1975945" cy="954107"/>
           </a:xfrm>
           <a:prstGeom prst="rect">
             <a:avLst/>
@@ -3916,17 +3960,17 @@
           <a:p>
             <a:r>
               <a:rPr lang="en-US" sz="1400" dirty="0"/>
-              <a:t>Create map to update robot locations</a:t>
-            </a:r>
-          </a:p>
-        </p:txBody>
-      </p:sp>
-      <p:sp>
-        <p:nvSpPr>
-          <p:cNvPr id="89" name="Rectangle 88">
-            <a:extLst>
-              <a:ext uri="{FF2B5EF4-FFF2-40B4-BE49-F238E27FC236}">
-                <a16:creationId xmlns:a16="http://schemas.microsoft.com/office/drawing/2014/main" id="{F17F3BDD-3043-CC47-B40C-802AB0257907}"/>
+              <a:t>Passes itself to networking so that networking can call job assigner</a:t>
+            </a:r>
+          </a:p>
+        </p:txBody>
+      </p:sp>
+      <p:sp>
+        <p:nvSpPr>
+          <p:cNvPr id="31" name="Rectangle 30">
+            <a:extLst>
+              <a:ext uri="{FF2B5EF4-FFF2-40B4-BE49-F238E27FC236}">
+                <a16:creationId xmlns:a16="http://schemas.microsoft.com/office/drawing/2014/main" id="{1A5C63E0-4E17-7546-AC4A-B972F29991F6}"/>
               </a:ext>
             </a:extLst>
           </p:cNvPr>
@@ -3935,8 +3979,8 @@
         </p:nvSpPr>
         <p:spPr>
           <a:xfrm>
-            <a:off x="10553392" y="1392530"/>
-            <a:ext cx="1387366" cy="735725"/>
+            <a:off x="8546923" y="3636579"/>
+            <a:ext cx="1450428" cy="683173"/>
           </a:xfrm>
           <a:prstGeom prst="rect">
             <a:avLst/>
@@ -3964,126 +4008,128 @@
           <a:p>
             <a:pPr algn="ctr"/>
             <a:r>
-              <a:rPr lang="en-US" b="1" dirty="0"/>
-              <a:t>Job Assigner</a:t>
+              <a:rPr lang="en-US" dirty="0"/>
+              <a:t>Networking</a:t>
+            </a:r>
+          </a:p>
+        </p:txBody>
+      </p:sp>
+      <p:sp>
+        <p:nvSpPr>
+          <p:cNvPr id="35" name="TextBox 34">
+            <a:extLst>
+              <a:ext uri="{FF2B5EF4-FFF2-40B4-BE49-F238E27FC236}">
+                <a16:creationId xmlns:a16="http://schemas.microsoft.com/office/drawing/2014/main" id="{89CFF39F-DC56-9741-982C-34DF7D2A99F1}"/>
+              </a:ext>
+            </a:extLst>
+          </p:cNvPr>
+          <p:cNvSpPr txBox="1"/>
+          <p:nvPr/>
+        </p:nvSpPr>
+        <p:spPr>
+          <a:xfrm rot="2111937">
+            <a:off x="7605917" y="2870778"/>
+            <a:ext cx="1975945" cy="523220"/>
+          </a:xfrm>
+          <a:prstGeom prst="rect">
+            <a:avLst/>
+          </a:prstGeom>
+          <a:noFill/>
+        </p:spPr>
+        <p:txBody>
+          <a:bodyPr wrap="square" rtlCol="0">
+            <a:spAutoFit/>
+          </a:bodyPr>
+          <a:lstStyle/>
+          <a:p>
+            <a:r>
+              <a:rPr lang="en-US" sz="1400" dirty="0"/>
+              <a:t>Asks for available robots and their locations</a:t>
             </a:r>
           </a:p>
         </p:txBody>
       </p:sp>
       <p:cxnSp>
         <p:nvCxnSpPr>
-          <p:cNvPr id="91" name="Straight Arrow Connector 90">
-            <a:extLst>
-              <a:ext uri="{FF2B5EF4-FFF2-40B4-BE49-F238E27FC236}">
-                <a16:creationId xmlns:a16="http://schemas.microsoft.com/office/drawing/2014/main" id="{283DCFBC-F498-974F-8EA2-15AF21B2912A}"/>
+          <p:cNvPr id="39" name="Straight Arrow Connector 38">
+            <a:extLst>
+              <a:ext uri="{FF2B5EF4-FFF2-40B4-BE49-F238E27FC236}">
+                <a16:creationId xmlns:a16="http://schemas.microsoft.com/office/drawing/2014/main" id="{BD125A88-3296-3F48-B4AC-505DF8C8439A}"/>
               </a:ext>
             </a:extLst>
           </p:cNvPr>
           <p:cNvCxnSpPr>
-            <a:cxnSpLocks/>
-            <a:endCxn id="89" idx="1"/>
+            <a:stCxn id="15" idx="2"/>
+            <a:endCxn id="31" idx="0"/>
           </p:cNvCxnSpPr>
           <p:nvPr/>
         </p:nvCxnSpPr>
         <p:spPr>
           <a:xfrm>
-            <a:off x="8523678" y="1065188"/>
-            <a:ext cx="2029714" cy="695205"/>
+            <a:off x="7635765" y="2517226"/>
+            <a:ext cx="1636372" cy="1119353"/>
           </a:xfrm>
           <a:prstGeom prst="straightConnector1">
             <a:avLst/>
           </a:prstGeom>
           <a:ln>
+            <a:headEnd type="triangle"/>
             <a:tailEnd type="triangle"/>
           </a:ln>
         </p:spPr>
         <p:style>
           <a:lnRef idx="1">
-            <a:schemeClr val="accent1"/>
+            <a:schemeClr val="accent2"/>
           </a:lnRef>
           <a:fillRef idx="0">
-            <a:schemeClr val="accent1"/>
+            <a:schemeClr val="accent2"/>
           </a:fillRef>
           <a:effectRef idx="0">
-            <a:schemeClr val="accent1"/>
+            <a:schemeClr val="accent2"/>
           </a:effectRef>
           <a:fontRef idx="minor">
             <a:schemeClr val="tx1"/>
           </a:fontRef>
         </p:style>
       </p:cxnSp>
-      <p:sp>
-        <p:nvSpPr>
-          <p:cNvPr id="94" name="TextBox 93">
-            <a:extLst>
-              <a:ext uri="{FF2B5EF4-FFF2-40B4-BE49-F238E27FC236}">
-                <a16:creationId xmlns:a16="http://schemas.microsoft.com/office/drawing/2014/main" id="{DDFAD904-6BE5-4F49-A7AC-D911DECB89DF}"/>
-              </a:ext>
-            </a:extLst>
-          </p:cNvPr>
-          <p:cNvSpPr txBox="1"/>
-          <p:nvPr/>
-        </p:nvSpPr>
-        <p:spPr>
-          <a:xfrm rot="1139259">
-            <a:off x="8701364" y="1158290"/>
-            <a:ext cx="1418896" cy="738664"/>
-          </a:xfrm>
-          <a:prstGeom prst="rect">
-            <a:avLst/>
-          </a:prstGeom>
-          <a:noFill/>
-        </p:spPr>
-        <p:txBody>
-          <a:bodyPr wrap="square" rtlCol="0">
-            <a:spAutoFit/>
-          </a:bodyPr>
-          <a:lstStyle/>
-          <a:p>
-            <a:r>
-              <a:rPr lang="en-US" sz="1400" dirty="0"/>
-              <a:t>Passes it the network class and the map</a:t>
-            </a:r>
-          </a:p>
-        </p:txBody>
-      </p:sp>
       <p:cxnSp>
         <p:nvCxnSpPr>
-          <p:cNvPr id="79" name="Straight Arrow Connector 78">
-            <a:extLst>
-              <a:ext uri="{FF2B5EF4-FFF2-40B4-BE49-F238E27FC236}">
-                <a16:creationId xmlns:a16="http://schemas.microsoft.com/office/drawing/2014/main" id="{161C6275-2EC4-2C44-82B2-B4493DAE2AF4}"/>
+          <p:cNvPr id="43" name="Straight Arrow Connector 42">
+            <a:extLst>
+              <a:ext uri="{FF2B5EF4-FFF2-40B4-BE49-F238E27FC236}">
+                <a16:creationId xmlns:a16="http://schemas.microsoft.com/office/drawing/2014/main" id="{AD5D9002-AA24-444B-9BE6-10293D867E7C}"/>
               </a:ext>
             </a:extLst>
           </p:cNvPr>
           <p:cNvCxnSpPr>
             <a:cxnSpLocks/>
-            <a:stCxn id="16" idx="2"/>
-            <a:endCxn id="102" idx="0"/>
+            <a:stCxn id="15" idx="2"/>
+            <a:endCxn id="44" idx="0"/>
           </p:cNvCxnSpPr>
           <p:nvPr/>
         </p:nvCxnSpPr>
         <p:spPr>
           <a:xfrm>
-            <a:off x="7866246" y="1065686"/>
-            <a:ext cx="1156688" cy="2049151"/>
+            <a:off x="7635765" y="2517226"/>
+            <a:ext cx="13752" cy="1785220"/>
           </a:xfrm>
           <a:prstGeom prst="straightConnector1">
             <a:avLst/>
           </a:prstGeom>
           <a:ln>
+            <a:headEnd type="triangle"/>
             <a:tailEnd type="triangle"/>
           </a:ln>
         </p:spPr>
         <p:style>
           <a:lnRef idx="1">
-            <a:schemeClr val="accent1"/>
+            <a:schemeClr val="accent3"/>
           </a:lnRef>
           <a:fillRef idx="0">
-            <a:schemeClr val="accent1"/>
+            <a:schemeClr val="accent3"/>
           </a:fillRef>
           <a:effectRef idx="0">
-            <a:schemeClr val="accent1"/>
+            <a:schemeClr val="accent3"/>
           </a:effectRef>
           <a:fontRef idx="minor">
             <a:schemeClr val="tx1"/>
@@ -4092,10 +4138,10 @@
       </p:cxnSp>
       <p:sp>
         <p:nvSpPr>
-          <p:cNvPr id="102" name="Rectangle 101">
-            <a:extLst>
-              <a:ext uri="{FF2B5EF4-FFF2-40B4-BE49-F238E27FC236}">
-                <a16:creationId xmlns:a16="http://schemas.microsoft.com/office/drawing/2014/main" id="{B20FD1C5-0ACF-6E4A-9C05-06973D84D320}"/>
+          <p:cNvPr id="44" name="Rectangle 43">
+            <a:extLst>
+              <a:ext uri="{FF2B5EF4-FFF2-40B4-BE49-F238E27FC236}">
+                <a16:creationId xmlns:a16="http://schemas.microsoft.com/office/drawing/2014/main" id="{5047A7FC-6419-684F-93E8-DA1FFA69E1DF}"/>
               </a:ext>
             </a:extLst>
           </p:cNvPr>
@@ -4104,8 +4150,8 @@
         </p:nvSpPr>
         <p:spPr>
           <a:xfrm>
-            <a:off x="8329251" y="3114837"/>
-            <a:ext cx="1387366" cy="735725"/>
+            <a:off x="6924303" y="4302446"/>
+            <a:ext cx="1450428" cy="683173"/>
           </a:xfrm>
           <a:prstGeom prst="rect">
             <a:avLst/>
@@ -4133,18 +4179,19 @@
           <a:p>
             <a:pPr algn="ctr"/>
             <a:r>
-              <a:rPr lang="en-US" b="1" dirty="0"/>
-              <a:t>Job Assigner</a:t>
-            </a:r>
-          </a:p>
-        </p:txBody>
-      </p:sp>
-      <p:sp>
-        <p:nvSpPr>
-          <p:cNvPr id="103" name="TextBox 102">
-            <a:extLst>
-              <a:ext uri="{FF2B5EF4-FFF2-40B4-BE49-F238E27FC236}">
-                <a16:creationId xmlns:a16="http://schemas.microsoft.com/office/drawing/2014/main" id="{12C15F19-BE1E-7844-8647-071C16993275}"/>
+              <a:rPr lang="en-US" dirty="0" err="1"/>
+              <a:t>RoutePlanner</a:t>
+            </a:r>
+            <a:endParaRPr lang="en-US" dirty="0"/>
+          </a:p>
+        </p:txBody>
+      </p:sp>
+      <p:sp>
+        <p:nvSpPr>
+          <p:cNvPr id="48" name="TextBox 47">
+            <a:extLst>
+              <a:ext uri="{FF2B5EF4-FFF2-40B4-BE49-F238E27FC236}">
+                <a16:creationId xmlns:a16="http://schemas.microsoft.com/office/drawing/2014/main" id="{56C50172-4F7E-B245-9EC9-16C043305473}"/>
               </a:ext>
             </a:extLst>
           </p:cNvPr>
@@ -4152,9 +4199,9 @@
           <p:nvPr/>
         </p:nvSpPr>
         <p:spPr>
-          <a:xfrm>
-            <a:off x="7659819" y="1789828"/>
-            <a:ext cx="1418896" cy="1384995"/>
+          <a:xfrm rot="16200000">
+            <a:off x="6772231" y="3240022"/>
+            <a:ext cx="1418896" cy="307777"/>
           </a:xfrm>
           <a:prstGeom prst="rect">
             <a:avLst/>
@@ -4169,17 +4216,17 @@
           <a:p>
             <a:r>
               <a:rPr lang="en-US" sz="1400" dirty="0"/>
-              <a:t>Asks for a route starting from a location/ asks for a route dependent on robot ID</a:t>
-            </a:r>
-          </a:p>
-        </p:txBody>
-      </p:sp>
-      <p:sp>
-        <p:nvSpPr>
-          <p:cNvPr id="110" name="Rectangle 109">
-            <a:extLst>
-              <a:ext uri="{FF2B5EF4-FFF2-40B4-BE49-F238E27FC236}">
-                <a16:creationId xmlns:a16="http://schemas.microsoft.com/office/drawing/2014/main" id="{50BF5613-D2D2-EF47-9944-2F250DFF6426}"/>
+              <a:t>Asks for route </a:t>
+            </a:r>
+          </a:p>
+        </p:txBody>
+      </p:sp>
+      <p:sp>
+        <p:nvSpPr>
+          <p:cNvPr id="50" name="Rectangle 49">
+            <a:extLst>
+              <a:ext uri="{FF2B5EF4-FFF2-40B4-BE49-F238E27FC236}">
+                <a16:creationId xmlns:a16="http://schemas.microsoft.com/office/drawing/2014/main" id="{AAC56DF6-C1AB-8849-9DBC-5EC8411A791D}"/>
               </a:ext>
             </a:extLst>
           </p:cNvPr>
@@ -4188,8 +4235,8 @@
         </p:nvSpPr>
         <p:spPr>
           <a:xfrm>
-            <a:off x="5562733" y="3114836"/>
-            <a:ext cx="1387366" cy="735725"/>
+            <a:off x="4916716" y="3636579"/>
+            <a:ext cx="1450428" cy="683173"/>
           </a:xfrm>
           <a:prstGeom prst="rect">
             <a:avLst/>
@@ -4217,31 +4264,31 @@
           <a:p>
             <a:pPr algn="ctr"/>
             <a:r>
-              <a:rPr lang="en-US" b="1" dirty="0"/>
-              <a:t>ROBOT</a:t>
+              <a:rPr lang="en-US" dirty="0"/>
+              <a:t>Networking</a:t>
             </a:r>
           </a:p>
         </p:txBody>
       </p:sp>
       <p:cxnSp>
         <p:nvCxnSpPr>
-          <p:cNvPr id="107" name="Straight Arrow Connector 106">
-            <a:extLst>
-              <a:ext uri="{FF2B5EF4-FFF2-40B4-BE49-F238E27FC236}">
-                <a16:creationId xmlns:a16="http://schemas.microsoft.com/office/drawing/2014/main" id="{ACCA1B62-3EC8-914B-94A0-FE7EE39116FE}"/>
+          <p:cNvPr id="52" name="Straight Arrow Connector 51">
+            <a:extLst>
+              <a:ext uri="{FF2B5EF4-FFF2-40B4-BE49-F238E27FC236}">
+                <a16:creationId xmlns:a16="http://schemas.microsoft.com/office/drawing/2014/main" id="{4584850E-368A-5146-9D2C-B66CC9FA745A}"/>
               </a:ext>
             </a:extLst>
           </p:cNvPr>
           <p:cNvCxnSpPr>
-            <a:stCxn id="16" idx="2"/>
-            <a:endCxn id="110" idx="0"/>
+            <a:stCxn id="15" idx="2"/>
+            <a:endCxn id="50" idx="0"/>
           </p:cNvCxnSpPr>
           <p:nvPr/>
         </p:nvCxnSpPr>
         <p:spPr>
           <a:xfrm flipH="1">
-            <a:off x="6256416" y="1065686"/>
-            <a:ext cx="1609830" cy="2049150"/>
+            <a:off x="5641930" y="2517226"/>
+            <a:ext cx="1993835" cy="1119353"/>
           </a:xfrm>
           <a:prstGeom prst="straightConnector1">
             <a:avLst/>
@@ -4252,13 +4299,13 @@
         </p:spPr>
         <p:style>
           <a:lnRef idx="1">
-            <a:schemeClr val="accent1"/>
+            <a:schemeClr val="accent6"/>
           </a:lnRef>
           <a:fillRef idx="0">
-            <a:schemeClr val="accent1"/>
+            <a:schemeClr val="accent6"/>
           </a:fillRef>
           <a:effectRef idx="0">
-            <a:schemeClr val="accent1"/>
+            <a:schemeClr val="accent6"/>
           </a:effectRef>
           <a:fontRef idx="minor">
             <a:schemeClr val="tx1"/>
@@ -4267,10 +4314,10 @@
       </p:cxnSp>
       <p:sp>
         <p:nvSpPr>
-          <p:cNvPr id="111" name="TextBox 110">
-            <a:extLst>
-              <a:ext uri="{FF2B5EF4-FFF2-40B4-BE49-F238E27FC236}">
-                <a16:creationId xmlns:a16="http://schemas.microsoft.com/office/drawing/2014/main" id="{8E74C9E8-4E04-E043-BD82-46B3FC441F9D}"/>
+          <p:cNvPr id="53" name="TextBox 52">
+            <a:extLst>
+              <a:ext uri="{FF2B5EF4-FFF2-40B4-BE49-F238E27FC236}">
+                <a16:creationId xmlns:a16="http://schemas.microsoft.com/office/drawing/2014/main" id="{FF55A187-93A6-144F-BDC9-5DA865EA62F4}"/>
               </a:ext>
             </a:extLst>
           </p:cNvPr>
@@ -4278,9 +4325,9 @@
           <p:nvPr/>
         </p:nvSpPr>
         <p:spPr>
-          <a:xfrm rot="18544253">
-            <a:off x="6060250" y="1615771"/>
-            <a:ext cx="1518782" cy="923330"/>
+          <a:xfrm rot="19828799">
+            <a:off x="5798805" y="2681262"/>
+            <a:ext cx="1418896" cy="738664"/>
           </a:xfrm>
           <a:prstGeom prst="rect">
             <a:avLst/>
@@ -4294,9 +4341,1000 @@
           <a:lstStyle/>
           <a:p>
             <a:r>
+              <a:rPr lang="en-US" sz="1400" dirty="0"/>
+              <a:t>Passes it the route and robot ID</a:t>
+            </a:r>
+          </a:p>
+        </p:txBody>
+      </p:sp>
+      <p:cxnSp>
+        <p:nvCxnSpPr>
+          <p:cNvPr id="55" name="Straight Arrow Connector 54">
+            <a:extLst>
+              <a:ext uri="{FF2B5EF4-FFF2-40B4-BE49-F238E27FC236}">
+                <a16:creationId xmlns:a16="http://schemas.microsoft.com/office/drawing/2014/main" id="{353995A4-E051-5A49-BA49-EFB5563F9A97}"/>
+              </a:ext>
+            </a:extLst>
+          </p:cNvPr>
+          <p:cNvCxnSpPr>
+            <a:cxnSpLocks/>
+            <a:stCxn id="50" idx="1"/>
+            <a:endCxn id="56" idx="3"/>
+          </p:cNvCxnSpPr>
+          <p:nvPr/>
+        </p:nvCxnSpPr>
+        <p:spPr>
+          <a:xfrm flipH="1">
+            <a:off x="3289737" y="3978166"/>
+            <a:ext cx="1626979" cy="6916"/>
+          </a:xfrm>
+          <a:prstGeom prst="straightConnector1">
+            <a:avLst/>
+          </a:prstGeom>
+          <a:ln>
+            <a:tailEnd type="triangle"/>
+          </a:ln>
+        </p:spPr>
+        <p:style>
+          <a:lnRef idx="1">
+            <a:schemeClr val="accent1"/>
+          </a:lnRef>
+          <a:fillRef idx="0">
+            <a:schemeClr val="accent1"/>
+          </a:fillRef>
+          <a:effectRef idx="0">
+            <a:schemeClr val="accent1"/>
+          </a:effectRef>
+          <a:fontRef idx="minor">
+            <a:schemeClr val="tx1"/>
+          </a:fontRef>
+        </p:style>
+      </p:cxnSp>
+      <p:sp>
+        <p:nvSpPr>
+          <p:cNvPr id="56" name="Rectangle 55">
+            <a:extLst>
+              <a:ext uri="{FF2B5EF4-FFF2-40B4-BE49-F238E27FC236}">
+                <a16:creationId xmlns:a16="http://schemas.microsoft.com/office/drawing/2014/main" id="{95D73C0B-9CE4-3A46-AEAB-9550057EB239}"/>
+              </a:ext>
+            </a:extLst>
+          </p:cNvPr>
+          <p:cNvSpPr/>
+          <p:nvPr/>
+        </p:nvSpPr>
+        <p:spPr>
+          <a:xfrm>
+            <a:off x="1839309" y="3643495"/>
+            <a:ext cx="1450428" cy="683173"/>
+          </a:xfrm>
+          <a:prstGeom prst="rect">
+            <a:avLst/>
+          </a:prstGeom>
+        </p:spPr>
+        <p:style>
+          <a:lnRef idx="2">
+            <a:schemeClr val="accent1">
+              <a:shade val="50000"/>
+            </a:schemeClr>
+          </a:lnRef>
+          <a:fillRef idx="1">
+            <a:schemeClr val="accent1"/>
+          </a:fillRef>
+          <a:effectRef idx="0">
+            <a:schemeClr val="accent1"/>
+          </a:effectRef>
+          <a:fontRef idx="minor">
+            <a:schemeClr val="lt1"/>
+          </a:fontRef>
+        </p:style>
+        <p:txBody>
+          <a:bodyPr rtlCol="0" anchor="ctr"/>
+          <a:lstStyle/>
+          <a:p>
+            <a:pPr algn="ctr"/>
+            <a:r>
               <a:rPr lang="en-US" dirty="0"/>
-              <a:t>Passes a bunch of locations</a:t>
-            </a:r>
+              <a:t>Robot</a:t>
+            </a:r>
+          </a:p>
+        </p:txBody>
+      </p:sp>
+      <p:sp>
+        <p:nvSpPr>
+          <p:cNvPr id="61" name="TextBox 60">
+            <a:extLst>
+              <a:ext uri="{FF2B5EF4-FFF2-40B4-BE49-F238E27FC236}">
+                <a16:creationId xmlns:a16="http://schemas.microsoft.com/office/drawing/2014/main" id="{70637422-913D-734B-AB72-546F31F6CDA5}"/>
+              </a:ext>
+            </a:extLst>
+          </p:cNvPr>
+          <p:cNvSpPr txBox="1"/>
+          <p:nvPr/>
+        </p:nvSpPr>
+        <p:spPr>
+          <a:xfrm>
+            <a:off x="3447392" y="3420122"/>
+            <a:ext cx="1418896" cy="523220"/>
+          </a:xfrm>
+          <a:prstGeom prst="rect">
+            <a:avLst/>
+          </a:prstGeom>
+          <a:noFill/>
+        </p:spPr>
+        <p:txBody>
+          <a:bodyPr wrap="square" rtlCol="0">
+            <a:spAutoFit/>
+          </a:bodyPr>
+          <a:lstStyle/>
+          <a:p>
+            <a:r>
+              <a:rPr lang="en-US" sz="1400" dirty="0"/>
+              <a:t>Passes it instructions</a:t>
+            </a:r>
+          </a:p>
+        </p:txBody>
+      </p:sp>
+      <p:sp>
+        <p:nvSpPr>
+          <p:cNvPr id="62" name="Rectangle 61">
+            <a:extLst>
+              <a:ext uri="{FF2B5EF4-FFF2-40B4-BE49-F238E27FC236}">
+                <a16:creationId xmlns:a16="http://schemas.microsoft.com/office/drawing/2014/main" id="{62BCC6B5-FCC2-F541-9006-3F8FEE02D48F}"/>
+              </a:ext>
+            </a:extLst>
+          </p:cNvPr>
+          <p:cNvSpPr/>
+          <p:nvPr/>
+        </p:nvSpPr>
+        <p:spPr>
+          <a:xfrm>
+            <a:off x="356846" y="6121210"/>
+            <a:ext cx="1450428" cy="683173"/>
+          </a:xfrm>
+          <a:prstGeom prst="rect">
+            <a:avLst/>
+          </a:prstGeom>
+        </p:spPr>
+        <p:style>
+          <a:lnRef idx="2">
+            <a:schemeClr val="accent1">
+              <a:shade val="50000"/>
+            </a:schemeClr>
+          </a:lnRef>
+          <a:fillRef idx="1">
+            <a:schemeClr val="accent1"/>
+          </a:fillRef>
+          <a:effectRef idx="0">
+            <a:schemeClr val="accent1"/>
+          </a:effectRef>
+          <a:fontRef idx="minor">
+            <a:schemeClr val="lt1"/>
+          </a:fontRef>
+        </p:style>
+        <p:txBody>
+          <a:bodyPr rtlCol="0" anchor="ctr"/>
+          <a:lstStyle/>
+          <a:p>
+            <a:pPr algn="ctr"/>
+            <a:r>
+              <a:rPr lang="en-US" dirty="0"/>
+              <a:t>Job Assigner</a:t>
+            </a:r>
+          </a:p>
+        </p:txBody>
+      </p:sp>
+      <p:sp>
+        <p:nvSpPr>
+          <p:cNvPr id="63" name="Rectangle 62">
+            <a:extLst>
+              <a:ext uri="{FF2B5EF4-FFF2-40B4-BE49-F238E27FC236}">
+                <a16:creationId xmlns:a16="http://schemas.microsoft.com/office/drawing/2014/main" id="{F540EF87-F60F-7348-8B36-C2C8BBB6C751}"/>
+              </a:ext>
+            </a:extLst>
+          </p:cNvPr>
+          <p:cNvSpPr/>
+          <p:nvPr/>
+        </p:nvSpPr>
+        <p:spPr>
+          <a:xfrm>
+            <a:off x="329714" y="4914857"/>
+            <a:ext cx="1450428" cy="683173"/>
+          </a:xfrm>
+          <a:prstGeom prst="rect">
+            <a:avLst/>
+          </a:prstGeom>
+        </p:spPr>
+        <p:style>
+          <a:lnRef idx="2">
+            <a:schemeClr val="accent1">
+              <a:shade val="50000"/>
+            </a:schemeClr>
+          </a:lnRef>
+          <a:fillRef idx="1">
+            <a:schemeClr val="accent1"/>
+          </a:fillRef>
+          <a:effectRef idx="0">
+            <a:schemeClr val="accent1"/>
+          </a:effectRef>
+          <a:fontRef idx="minor">
+            <a:schemeClr val="lt1"/>
+          </a:fontRef>
+        </p:style>
+        <p:txBody>
+          <a:bodyPr rtlCol="0" anchor="ctr"/>
+          <a:lstStyle/>
+          <a:p>
+            <a:pPr algn="ctr"/>
+            <a:r>
+              <a:rPr lang="en-US" dirty="0"/>
+              <a:t>Networking</a:t>
+            </a:r>
+          </a:p>
+        </p:txBody>
+      </p:sp>
+      <p:cxnSp>
+        <p:nvCxnSpPr>
+          <p:cNvPr id="65" name="Straight Arrow Connector 64">
+            <a:extLst>
+              <a:ext uri="{FF2B5EF4-FFF2-40B4-BE49-F238E27FC236}">
+                <a16:creationId xmlns:a16="http://schemas.microsoft.com/office/drawing/2014/main" id="{452FDB96-C683-8242-94DF-EDCE5B72A430}"/>
+              </a:ext>
+            </a:extLst>
+          </p:cNvPr>
+          <p:cNvCxnSpPr>
+            <a:stCxn id="56" idx="2"/>
+            <a:endCxn id="63" idx="0"/>
+          </p:cNvCxnSpPr>
+          <p:nvPr/>
+        </p:nvCxnSpPr>
+        <p:spPr>
+          <a:xfrm flipH="1">
+            <a:off x="1054928" y="4326668"/>
+            <a:ext cx="1509595" cy="588189"/>
+          </a:xfrm>
+          <a:prstGeom prst="straightConnector1">
+            <a:avLst/>
+          </a:prstGeom>
+          <a:ln>
+            <a:tailEnd type="triangle"/>
+          </a:ln>
+        </p:spPr>
+        <p:style>
+          <a:lnRef idx="1">
+            <a:schemeClr val="accent1"/>
+          </a:lnRef>
+          <a:fillRef idx="0">
+            <a:schemeClr val="accent1"/>
+          </a:fillRef>
+          <a:effectRef idx="0">
+            <a:schemeClr val="accent1"/>
+          </a:effectRef>
+          <a:fontRef idx="minor">
+            <a:schemeClr val="tx1"/>
+          </a:fontRef>
+        </p:style>
+      </p:cxnSp>
+      <p:sp>
+        <p:nvSpPr>
+          <p:cNvPr id="66" name="TextBox 65">
+            <a:extLst>
+              <a:ext uri="{FF2B5EF4-FFF2-40B4-BE49-F238E27FC236}">
+                <a16:creationId xmlns:a16="http://schemas.microsoft.com/office/drawing/2014/main" id="{9943E9A0-C839-8043-80AF-7224725CCD72}"/>
+              </a:ext>
+            </a:extLst>
+          </p:cNvPr>
+          <p:cNvSpPr txBox="1"/>
+          <p:nvPr/>
+        </p:nvSpPr>
+        <p:spPr>
+          <a:xfrm>
+            <a:off x="6372802" y="5270073"/>
+            <a:ext cx="1418896" cy="523220"/>
+          </a:xfrm>
+          <a:prstGeom prst="rect">
+            <a:avLst/>
+          </a:prstGeom>
+          <a:noFill/>
+        </p:spPr>
+        <p:txBody>
+          <a:bodyPr wrap="square" rtlCol="0">
+            <a:spAutoFit/>
+          </a:bodyPr>
+          <a:lstStyle/>
+          <a:p>
+            <a:r>
+              <a:rPr lang="en-US" sz="1400" dirty="0"/>
+              <a:t>Tells robot that it has reached goal</a:t>
+            </a:r>
+          </a:p>
+        </p:txBody>
+      </p:sp>
+      <p:sp>
+        <p:nvSpPr>
+          <p:cNvPr id="67" name="TextBox 66">
+            <a:extLst>
+              <a:ext uri="{FF2B5EF4-FFF2-40B4-BE49-F238E27FC236}">
+                <a16:creationId xmlns:a16="http://schemas.microsoft.com/office/drawing/2014/main" id="{045B2E96-C8A8-BA48-86AF-3DCA706E0D50}"/>
+              </a:ext>
+            </a:extLst>
+          </p:cNvPr>
+          <p:cNvSpPr txBox="1"/>
+          <p:nvPr/>
+        </p:nvSpPr>
+        <p:spPr>
+          <a:xfrm rot="2298516">
+            <a:off x="2936548" y="4668060"/>
+            <a:ext cx="1418896" cy="307777"/>
+          </a:xfrm>
+          <a:prstGeom prst="rect">
+            <a:avLst/>
+          </a:prstGeom>
+          <a:noFill/>
+        </p:spPr>
+        <p:txBody>
+          <a:bodyPr wrap="square" rtlCol="0">
+            <a:spAutoFit/>
+          </a:bodyPr>
+          <a:lstStyle/>
+          <a:p>
+            <a:r>
+              <a:rPr lang="en-US" sz="1400" dirty="0"/>
+              <a:t>Reached Goal</a:t>
+            </a:r>
+          </a:p>
+        </p:txBody>
+      </p:sp>
+      <p:sp>
+        <p:nvSpPr>
+          <p:cNvPr id="68" name="TextBox 67">
+            <a:extLst>
+              <a:ext uri="{FF2B5EF4-FFF2-40B4-BE49-F238E27FC236}">
+                <a16:creationId xmlns:a16="http://schemas.microsoft.com/office/drawing/2014/main" id="{B7AD648F-4148-3E45-9757-B4C0C13D27D5}"/>
+              </a:ext>
+            </a:extLst>
+          </p:cNvPr>
+          <p:cNvSpPr txBox="1"/>
+          <p:nvPr/>
+        </p:nvSpPr>
+        <p:spPr>
+          <a:xfrm rot="20040692">
+            <a:off x="345480" y="3584037"/>
+            <a:ext cx="1418896" cy="523220"/>
+          </a:xfrm>
+          <a:prstGeom prst="rect">
+            <a:avLst/>
+          </a:prstGeom>
+          <a:noFill/>
+        </p:spPr>
+        <p:txBody>
+          <a:bodyPr wrap="square" rtlCol="0">
+            <a:spAutoFit/>
+          </a:bodyPr>
+          <a:lstStyle/>
+          <a:p>
+            <a:r>
+              <a:rPr lang="en-US" sz="1400" dirty="0"/>
+              <a:t>Updates in location</a:t>
+            </a:r>
+          </a:p>
+        </p:txBody>
+      </p:sp>
+      <p:sp>
+        <p:nvSpPr>
+          <p:cNvPr id="69" name="TextBox 68">
+            <a:extLst>
+              <a:ext uri="{FF2B5EF4-FFF2-40B4-BE49-F238E27FC236}">
+                <a16:creationId xmlns:a16="http://schemas.microsoft.com/office/drawing/2014/main" id="{DC8D18FD-AD85-FB40-97CB-27C448AE0D98}"/>
+              </a:ext>
+            </a:extLst>
+          </p:cNvPr>
+          <p:cNvSpPr txBox="1"/>
+          <p:nvPr/>
+        </p:nvSpPr>
+        <p:spPr>
+          <a:xfrm rot="1193341">
+            <a:off x="10111187" y="3076704"/>
+            <a:ext cx="1418896" cy="523220"/>
+          </a:xfrm>
+          <a:prstGeom prst="rect">
+            <a:avLst/>
+          </a:prstGeom>
+          <a:noFill/>
+        </p:spPr>
+        <p:txBody>
+          <a:bodyPr wrap="square" rtlCol="0">
+            <a:spAutoFit/>
+          </a:bodyPr>
+          <a:lstStyle/>
+          <a:p>
+            <a:r>
+              <a:rPr lang="en-US" sz="1400" dirty="0"/>
+              <a:t>Starts Loop again</a:t>
+            </a:r>
+          </a:p>
+        </p:txBody>
+      </p:sp>
+      <p:sp>
+        <p:nvSpPr>
+          <p:cNvPr id="71" name="TextBox 70">
+            <a:extLst>
+              <a:ext uri="{FF2B5EF4-FFF2-40B4-BE49-F238E27FC236}">
+                <a16:creationId xmlns:a16="http://schemas.microsoft.com/office/drawing/2014/main" id="{4C6BFF1D-FBCF-F142-B709-5436AB8843A2}"/>
+              </a:ext>
+            </a:extLst>
+          </p:cNvPr>
+          <p:cNvSpPr txBox="1"/>
+          <p:nvPr/>
+        </p:nvSpPr>
+        <p:spPr>
+          <a:xfrm rot="20193307">
+            <a:off x="892383" y="4195092"/>
+            <a:ext cx="1418896" cy="523220"/>
+          </a:xfrm>
+          <a:prstGeom prst="rect">
+            <a:avLst/>
+          </a:prstGeom>
+          <a:noFill/>
+        </p:spPr>
+        <p:txBody>
+          <a:bodyPr wrap="square" rtlCol="0">
+            <a:spAutoFit/>
+          </a:bodyPr>
+          <a:lstStyle/>
+          <a:p>
+            <a:r>
+              <a:rPr lang="en-US" sz="1400" dirty="0"/>
+              <a:t>Updates in location</a:t>
+            </a:r>
+          </a:p>
+        </p:txBody>
+      </p:sp>
+      <p:cxnSp>
+        <p:nvCxnSpPr>
+          <p:cNvPr id="72" name="Straight Arrow Connector 71">
+            <a:extLst>
+              <a:ext uri="{FF2B5EF4-FFF2-40B4-BE49-F238E27FC236}">
+                <a16:creationId xmlns:a16="http://schemas.microsoft.com/office/drawing/2014/main" id="{A8184C80-A880-B44D-A72C-CA72EEE74227}"/>
+              </a:ext>
+            </a:extLst>
+          </p:cNvPr>
+          <p:cNvCxnSpPr>
+            <a:cxnSpLocks/>
+            <a:stCxn id="56" idx="2"/>
+            <a:endCxn id="77" idx="0"/>
+          </p:cNvCxnSpPr>
+          <p:nvPr/>
+        </p:nvCxnSpPr>
+        <p:spPr>
+          <a:xfrm>
+            <a:off x="2564523" y="4326668"/>
+            <a:ext cx="1309471" cy="829627"/>
+          </a:xfrm>
+          <a:prstGeom prst="straightConnector1">
+            <a:avLst/>
+          </a:prstGeom>
+          <a:ln>
+            <a:tailEnd type="triangle"/>
+          </a:ln>
+        </p:spPr>
+        <p:style>
+          <a:lnRef idx="1">
+            <a:schemeClr val="accent2"/>
+          </a:lnRef>
+          <a:fillRef idx="0">
+            <a:schemeClr val="accent2"/>
+          </a:fillRef>
+          <a:effectRef idx="0">
+            <a:schemeClr val="accent2"/>
+          </a:effectRef>
+          <a:fontRef idx="minor">
+            <a:schemeClr val="tx1"/>
+          </a:fontRef>
+        </p:style>
+      </p:cxnSp>
+      <p:cxnSp>
+        <p:nvCxnSpPr>
+          <p:cNvPr id="73" name="Straight Arrow Connector 72">
+            <a:extLst>
+              <a:ext uri="{FF2B5EF4-FFF2-40B4-BE49-F238E27FC236}">
+                <a16:creationId xmlns:a16="http://schemas.microsoft.com/office/drawing/2014/main" id="{7377E072-2888-C54C-AD0B-8A6077B7391E}"/>
+              </a:ext>
+            </a:extLst>
+          </p:cNvPr>
+          <p:cNvCxnSpPr>
+            <a:cxnSpLocks/>
+            <a:stCxn id="63" idx="2"/>
+            <a:endCxn id="62" idx="0"/>
+          </p:cNvCxnSpPr>
+          <p:nvPr/>
+        </p:nvCxnSpPr>
+        <p:spPr>
+          <a:xfrm>
+            <a:off x="1054928" y="5598030"/>
+            <a:ext cx="27132" cy="523180"/>
+          </a:xfrm>
+          <a:prstGeom prst="straightConnector1">
+            <a:avLst/>
+          </a:prstGeom>
+          <a:ln>
+            <a:tailEnd type="triangle"/>
+          </a:ln>
+        </p:spPr>
+        <p:style>
+          <a:lnRef idx="1">
+            <a:schemeClr val="accent1"/>
+          </a:lnRef>
+          <a:fillRef idx="0">
+            <a:schemeClr val="accent1"/>
+          </a:fillRef>
+          <a:effectRef idx="0">
+            <a:schemeClr val="accent1"/>
+          </a:effectRef>
+          <a:fontRef idx="minor">
+            <a:schemeClr val="tx1"/>
+          </a:fontRef>
+        </p:style>
+      </p:cxnSp>
+      <p:sp>
+        <p:nvSpPr>
+          <p:cNvPr id="77" name="Rectangle 76">
+            <a:extLst>
+              <a:ext uri="{FF2B5EF4-FFF2-40B4-BE49-F238E27FC236}">
+                <a16:creationId xmlns:a16="http://schemas.microsoft.com/office/drawing/2014/main" id="{A62F0EF8-CA0C-F84E-B37E-A78959224765}"/>
+              </a:ext>
+            </a:extLst>
+          </p:cNvPr>
+          <p:cNvSpPr/>
+          <p:nvPr/>
+        </p:nvSpPr>
+        <p:spPr>
+          <a:xfrm>
+            <a:off x="3148780" y="5156295"/>
+            <a:ext cx="1450428" cy="683173"/>
+          </a:xfrm>
+          <a:prstGeom prst="rect">
+            <a:avLst/>
+          </a:prstGeom>
+        </p:spPr>
+        <p:style>
+          <a:lnRef idx="2">
+            <a:schemeClr val="accent1">
+              <a:shade val="50000"/>
+            </a:schemeClr>
+          </a:lnRef>
+          <a:fillRef idx="1">
+            <a:schemeClr val="accent1"/>
+          </a:fillRef>
+          <a:effectRef idx="0">
+            <a:schemeClr val="accent1"/>
+          </a:effectRef>
+          <a:fontRef idx="minor">
+            <a:schemeClr val="lt1"/>
+          </a:fontRef>
+        </p:style>
+        <p:txBody>
+          <a:bodyPr rtlCol="0" anchor="ctr"/>
+          <a:lstStyle/>
+          <a:p>
+            <a:pPr algn="ctr"/>
+            <a:r>
+              <a:rPr lang="en-US" dirty="0"/>
+              <a:t>Networking</a:t>
+            </a:r>
+          </a:p>
+        </p:txBody>
+      </p:sp>
+      <p:sp>
+        <p:nvSpPr>
+          <p:cNvPr id="81" name="Rectangle 80">
+            <a:extLst>
+              <a:ext uri="{FF2B5EF4-FFF2-40B4-BE49-F238E27FC236}">
+                <a16:creationId xmlns:a16="http://schemas.microsoft.com/office/drawing/2014/main" id="{46C46270-4806-A748-9AC3-CEBB5A0277B1}"/>
+              </a:ext>
+            </a:extLst>
+          </p:cNvPr>
+          <p:cNvSpPr/>
+          <p:nvPr/>
+        </p:nvSpPr>
+        <p:spPr>
+          <a:xfrm>
+            <a:off x="10462441" y="5156294"/>
+            <a:ext cx="1450428" cy="683173"/>
+          </a:xfrm>
+          <a:prstGeom prst="rect">
+            <a:avLst/>
+          </a:prstGeom>
+        </p:spPr>
+        <p:style>
+          <a:lnRef idx="2">
+            <a:schemeClr val="accent1">
+              <a:shade val="50000"/>
+            </a:schemeClr>
+          </a:lnRef>
+          <a:fillRef idx="1">
+            <a:schemeClr val="accent1"/>
+          </a:fillRef>
+          <a:effectRef idx="0">
+            <a:schemeClr val="accent1"/>
+          </a:effectRef>
+          <a:fontRef idx="minor">
+            <a:schemeClr val="lt1"/>
+          </a:fontRef>
+        </p:style>
+        <p:txBody>
+          <a:bodyPr rtlCol="0" anchor="ctr"/>
+          <a:lstStyle/>
+          <a:p>
+            <a:pPr algn="ctr"/>
+            <a:r>
+              <a:rPr lang="en-US" dirty="0"/>
+              <a:t>Job Assigner</a:t>
+            </a:r>
+          </a:p>
+        </p:txBody>
+      </p:sp>
+      <p:cxnSp>
+        <p:nvCxnSpPr>
+          <p:cNvPr id="83" name="Straight Arrow Connector 82">
+            <a:extLst>
+              <a:ext uri="{FF2B5EF4-FFF2-40B4-BE49-F238E27FC236}">
+                <a16:creationId xmlns:a16="http://schemas.microsoft.com/office/drawing/2014/main" id="{79D2F4CD-D60F-AF4C-96FE-A269A4AB9A66}"/>
+              </a:ext>
+            </a:extLst>
+          </p:cNvPr>
+          <p:cNvCxnSpPr>
+            <a:cxnSpLocks/>
+            <a:stCxn id="77" idx="3"/>
+            <a:endCxn id="81" idx="1"/>
+          </p:cNvCxnSpPr>
+          <p:nvPr/>
+        </p:nvCxnSpPr>
+        <p:spPr>
+          <a:xfrm flipV="1">
+            <a:off x="4599208" y="5497881"/>
+            <a:ext cx="5863233" cy="1"/>
+          </a:xfrm>
+          <a:prstGeom prst="straightConnector1">
+            <a:avLst/>
+          </a:prstGeom>
+          <a:ln>
+            <a:tailEnd type="triangle"/>
+          </a:ln>
+        </p:spPr>
+        <p:style>
+          <a:lnRef idx="1">
+            <a:schemeClr val="accent1"/>
+          </a:lnRef>
+          <a:fillRef idx="0">
+            <a:schemeClr val="accent1"/>
+          </a:fillRef>
+          <a:effectRef idx="0">
+            <a:schemeClr val="accent1"/>
+          </a:effectRef>
+          <a:fontRef idx="minor">
+            <a:schemeClr val="tx1"/>
+          </a:fontRef>
+        </p:style>
+      </p:cxnSp>
+      <p:cxnSp>
+        <p:nvCxnSpPr>
+          <p:cNvPr id="88" name="Straight Arrow Connector 87">
+            <a:extLst>
+              <a:ext uri="{FF2B5EF4-FFF2-40B4-BE49-F238E27FC236}">
+                <a16:creationId xmlns:a16="http://schemas.microsoft.com/office/drawing/2014/main" id="{EB284C55-ED1F-044B-A636-AD54DDDE2860}"/>
+              </a:ext>
+            </a:extLst>
+          </p:cNvPr>
+          <p:cNvCxnSpPr>
+            <a:cxnSpLocks/>
+          </p:cNvCxnSpPr>
+          <p:nvPr/>
+        </p:nvCxnSpPr>
+        <p:spPr>
+          <a:xfrm flipH="1" flipV="1">
+            <a:off x="8329251" y="2517227"/>
+            <a:ext cx="2873548" cy="965658"/>
+          </a:xfrm>
+          <a:prstGeom prst="straightConnector1">
+            <a:avLst/>
+          </a:prstGeom>
+          <a:ln>
+            <a:tailEnd type="triangle"/>
+          </a:ln>
+        </p:spPr>
+        <p:style>
+          <a:lnRef idx="1">
+            <a:schemeClr val="accent1"/>
+          </a:lnRef>
+          <a:fillRef idx="0">
+            <a:schemeClr val="accent1"/>
+          </a:fillRef>
+          <a:effectRef idx="0">
+            <a:schemeClr val="accent1"/>
+          </a:effectRef>
+          <a:fontRef idx="minor">
+            <a:schemeClr val="tx1"/>
+          </a:fontRef>
+        </p:style>
+      </p:cxnSp>
+      <p:cxnSp>
+        <p:nvCxnSpPr>
+          <p:cNvPr id="93" name="Straight Connector 92">
+            <a:extLst>
+              <a:ext uri="{FF2B5EF4-FFF2-40B4-BE49-F238E27FC236}">
+                <a16:creationId xmlns:a16="http://schemas.microsoft.com/office/drawing/2014/main" id="{DB4E84EC-B8B4-AB4A-8361-1C174B8EBA8E}"/>
+              </a:ext>
+            </a:extLst>
+          </p:cNvPr>
+          <p:cNvCxnSpPr>
+            <a:cxnSpLocks/>
+            <a:endCxn id="81" idx="0"/>
+          </p:cNvCxnSpPr>
+          <p:nvPr/>
+        </p:nvCxnSpPr>
+        <p:spPr>
+          <a:xfrm>
+            <a:off x="11187655" y="3482885"/>
+            <a:ext cx="0" cy="1673409"/>
+          </a:xfrm>
+          <a:prstGeom prst="line">
+            <a:avLst/>
+          </a:prstGeom>
+        </p:spPr>
+        <p:style>
+          <a:lnRef idx="1">
+            <a:schemeClr val="accent1"/>
+          </a:lnRef>
+          <a:fillRef idx="0">
+            <a:schemeClr val="accent1"/>
+          </a:fillRef>
+          <a:effectRef idx="0">
+            <a:schemeClr val="accent1"/>
+          </a:effectRef>
+          <a:fontRef idx="minor">
+            <a:schemeClr val="tx1"/>
+          </a:fontRef>
+        </p:style>
+      </p:cxnSp>
+      <p:cxnSp>
+        <p:nvCxnSpPr>
+          <p:cNvPr id="97" name="Straight Arrow Connector 96">
+            <a:extLst>
+              <a:ext uri="{FF2B5EF4-FFF2-40B4-BE49-F238E27FC236}">
+                <a16:creationId xmlns:a16="http://schemas.microsoft.com/office/drawing/2014/main" id="{BCF47BE3-4D3C-BB44-8DBB-F54FB0B48184}"/>
+              </a:ext>
+            </a:extLst>
+          </p:cNvPr>
+          <p:cNvCxnSpPr>
+            <a:cxnSpLocks/>
+          </p:cNvCxnSpPr>
+          <p:nvPr/>
+        </p:nvCxnSpPr>
+        <p:spPr>
+          <a:xfrm flipV="1">
+            <a:off x="7056176" y="6163748"/>
+            <a:ext cx="827589" cy="1"/>
+          </a:xfrm>
+          <a:prstGeom prst="straightConnector1">
+            <a:avLst/>
+          </a:prstGeom>
+          <a:ln>
+            <a:tailEnd type="triangle"/>
+          </a:ln>
+        </p:spPr>
+        <p:style>
+          <a:lnRef idx="1">
+            <a:schemeClr val="accent1"/>
+          </a:lnRef>
+          <a:fillRef idx="0">
+            <a:schemeClr val="accent1"/>
+          </a:fillRef>
+          <a:effectRef idx="0">
+            <a:schemeClr val="accent1"/>
+          </a:effectRef>
+          <a:fontRef idx="minor">
+            <a:schemeClr val="tx1"/>
+          </a:fontRef>
+        </p:style>
+      </p:cxnSp>
+      <p:cxnSp>
+        <p:nvCxnSpPr>
+          <p:cNvPr id="99" name="Straight Arrow Connector 98">
+            <a:extLst>
+              <a:ext uri="{FF2B5EF4-FFF2-40B4-BE49-F238E27FC236}">
+                <a16:creationId xmlns:a16="http://schemas.microsoft.com/office/drawing/2014/main" id="{3CBD9781-3479-3342-82F8-A15DFDB7642D}"/>
+              </a:ext>
+            </a:extLst>
+          </p:cNvPr>
+          <p:cNvCxnSpPr>
+            <a:cxnSpLocks/>
+          </p:cNvCxnSpPr>
+          <p:nvPr/>
+        </p:nvCxnSpPr>
+        <p:spPr>
+          <a:xfrm>
+            <a:off x="7056175" y="6294327"/>
+            <a:ext cx="827589" cy="0"/>
+          </a:xfrm>
+          <a:prstGeom prst="straightConnector1">
+            <a:avLst/>
+          </a:prstGeom>
+          <a:ln>
+            <a:headEnd type="triangle"/>
+            <a:tailEnd type="triangle"/>
+          </a:ln>
+        </p:spPr>
+        <p:style>
+          <a:lnRef idx="1">
+            <a:schemeClr val="accent2"/>
+          </a:lnRef>
+          <a:fillRef idx="0">
+            <a:schemeClr val="accent2"/>
+          </a:fillRef>
+          <a:effectRef idx="0">
+            <a:schemeClr val="accent2"/>
+          </a:effectRef>
+          <a:fontRef idx="minor">
+            <a:schemeClr val="tx1"/>
+          </a:fontRef>
+        </p:style>
+      </p:cxnSp>
+      <p:cxnSp>
+        <p:nvCxnSpPr>
+          <p:cNvPr id="105" name="Straight Arrow Connector 104">
+            <a:extLst>
+              <a:ext uri="{FF2B5EF4-FFF2-40B4-BE49-F238E27FC236}">
+                <a16:creationId xmlns:a16="http://schemas.microsoft.com/office/drawing/2014/main" id="{92DDC026-D517-394B-9FEE-71BC2488B34C}"/>
+              </a:ext>
+            </a:extLst>
+          </p:cNvPr>
+          <p:cNvCxnSpPr>
+            <a:cxnSpLocks/>
+          </p:cNvCxnSpPr>
+          <p:nvPr/>
+        </p:nvCxnSpPr>
+        <p:spPr>
+          <a:xfrm flipH="1">
+            <a:off x="7049262" y="6462796"/>
+            <a:ext cx="834502" cy="0"/>
+          </a:xfrm>
+          <a:prstGeom prst="straightConnector1">
+            <a:avLst/>
+          </a:prstGeom>
+          <a:ln>
+            <a:headEnd type="triangle"/>
+            <a:tailEnd type="triangle"/>
+          </a:ln>
+        </p:spPr>
+        <p:style>
+          <a:lnRef idx="1">
+            <a:schemeClr val="accent3"/>
+          </a:lnRef>
+          <a:fillRef idx="0">
+            <a:schemeClr val="accent3"/>
+          </a:fillRef>
+          <a:effectRef idx="0">
+            <a:schemeClr val="accent3"/>
+          </a:effectRef>
+          <a:fontRef idx="minor">
+            <a:schemeClr val="tx1"/>
+          </a:fontRef>
+        </p:style>
+      </p:cxnSp>
+      <p:cxnSp>
+        <p:nvCxnSpPr>
+          <p:cNvPr id="108" name="Straight Arrow Connector 107">
+            <a:extLst>
+              <a:ext uri="{FF2B5EF4-FFF2-40B4-BE49-F238E27FC236}">
+                <a16:creationId xmlns:a16="http://schemas.microsoft.com/office/drawing/2014/main" id="{723EC177-25A9-6E41-A81C-03A8323B1D8C}"/>
+              </a:ext>
+            </a:extLst>
+          </p:cNvPr>
+          <p:cNvCxnSpPr>
+            <a:cxnSpLocks/>
+          </p:cNvCxnSpPr>
+          <p:nvPr/>
+        </p:nvCxnSpPr>
+        <p:spPr>
+          <a:xfrm flipH="1">
+            <a:off x="7049262" y="6600429"/>
+            <a:ext cx="816984" cy="0"/>
+          </a:xfrm>
+          <a:prstGeom prst="straightConnector1">
+            <a:avLst/>
+          </a:prstGeom>
+          <a:ln>
+            <a:tailEnd type="triangle"/>
+          </a:ln>
+        </p:spPr>
+        <p:style>
+          <a:lnRef idx="1">
+            <a:schemeClr val="accent6"/>
+          </a:lnRef>
+          <a:fillRef idx="0">
+            <a:schemeClr val="accent6"/>
+          </a:fillRef>
+          <a:effectRef idx="0">
+            <a:schemeClr val="accent6"/>
+          </a:effectRef>
+          <a:fontRef idx="minor">
+            <a:schemeClr val="tx1"/>
+          </a:fontRef>
+        </p:style>
+      </p:cxnSp>
+      <p:sp>
+        <p:nvSpPr>
+          <p:cNvPr id="109" name="TextBox 108">
+            <a:extLst>
+              <a:ext uri="{FF2B5EF4-FFF2-40B4-BE49-F238E27FC236}">
+                <a16:creationId xmlns:a16="http://schemas.microsoft.com/office/drawing/2014/main" id="{414C2711-D23F-A64D-8EC0-E6DCEA8C70D7}"/>
+              </a:ext>
+            </a:extLst>
+          </p:cNvPr>
+          <p:cNvSpPr txBox="1"/>
+          <p:nvPr/>
+        </p:nvSpPr>
+        <p:spPr>
+          <a:xfrm>
+            <a:off x="7813433" y="5981867"/>
+            <a:ext cx="1031636" cy="1046440"/>
+          </a:xfrm>
+          <a:prstGeom prst="rect">
+            <a:avLst/>
+          </a:prstGeom>
+          <a:noFill/>
+        </p:spPr>
+        <p:txBody>
+          <a:bodyPr wrap="square" rtlCol="0">
+            <a:spAutoFit/>
+          </a:bodyPr>
+          <a:lstStyle/>
+          <a:p>
+            <a:r>
+              <a:rPr lang="en-US" sz="1100" dirty="0"/>
+              <a:t>1</a:t>
+            </a:r>
+            <a:r>
+              <a:rPr lang="en-US" sz="1100" baseline="30000" dirty="0"/>
+              <a:t>st</a:t>
+            </a:r>
+            <a:endParaRPr lang="en-US" sz="1100" dirty="0"/>
+          </a:p>
+          <a:p>
+            <a:r>
+              <a:rPr lang="en-US" sz="1100" dirty="0"/>
+              <a:t>2</a:t>
+            </a:r>
+            <a:r>
+              <a:rPr lang="en-US" sz="1100" baseline="30000" dirty="0"/>
+              <a:t>nd</a:t>
+            </a:r>
+            <a:endParaRPr lang="en-US" sz="1100" dirty="0"/>
+          </a:p>
+          <a:p>
+            <a:r>
+              <a:rPr lang="en-US" sz="1100" dirty="0"/>
+              <a:t>3</a:t>
+            </a:r>
+            <a:r>
+              <a:rPr lang="en-US" sz="1100" baseline="30000" dirty="0"/>
+              <a:t>rd</a:t>
+            </a:r>
+            <a:endParaRPr lang="en-US" sz="1100" dirty="0"/>
+          </a:p>
+          <a:p>
+            <a:r>
+              <a:rPr lang="en-US" sz="1100" dirty="0"/>
+              <a:t>4</a:t>
+            </a:r>
+            <a:r>
+              <a:rPr lang="en-US" sz="1100" baseline="30000" dirty="0"/>
+              <a:t>th</a:t>
+            </a:r>
+            <a:endParaRPr lang="en-US" sz="1100" dirty="0"/>
+          </a:p>
+          <a:p>
+            <a:endParaRPr lang="en-US" dirty="0"/>
           </a:p>
         </p:txBody>
       </p:sp>

</xml_diff>